<commit_message>
Updated art style page
</commit_message>
<xml_diff>
--- a/Group 14.pptx
+++ b/Group 14.pptx
@@ -110,6 +110,11 @@
       </a:defRPr>
     </a:lvl9pPr>
   </p:defaultTextStyle>
+  <p:extLst>
+    <p:ext uri="{EFAFB233-063F-42B5-8137-9DF3F51BA10A}">
+      <p15:sldGuideLst xmlns:p15="http://schemas.microsoft.com/office/powerpoint/2012/main"/>
+    </p:ext>
+  </p:extLst>
 </p:presentation>
 </file>
 
@@ -691,7 +696,7 @@
           </a:lstStyle>
           <a:p>
             <a:r>
-              <a:rPr lang="en-US" smtClean="0"/>
+              <a:rPr lang="en-US"/>
               <a:t>Click to edit Master title style</a:t>
             </a:r>
             <a:endParaRPr lang="en-US" dirty="0"/>
@@ -811,7 +816,7 @@
           </a:lstStyle>
           <a:p>
             <a:r>
-              <a:rPr lang="en-US" smtClean="0"/>
+              <a:rPr lang="en-US"/>
               <a:t>Click to edit Master subtitle style</a:t>
             </a:r>
             <a:endParaRPr lang="en-US" dirty="0"/>
@@ -940,7 +945,7 @@
           </a:lstStyle>
           <a:p>
             <a:r>
-              <a:rPr lang="en-US" smtClean="0"/>
+              <a:rPr lang="en-US"/>
               <a:t>Click to edit Master title style</a:t>
             </a:r>
             <a:endParaRPr lang="en-US" dirty="0"/>
@@ -1063,7 +1068,7 @@
           <a:p>
             <a:pPr lvl="0"/>
             <a:r>
-              <a:rPr lang="en-US" smtClean="0"/>
+              <a:rPr lang="en-US"/>
               <a:t>Click to edit Master text styles</a:t>
             </a:r>
           </a:p>
@@ -1191,7 +1196,7 @@
           </a:lstStyle>
           <a:p>
             <a:r>
-              <a:rPr lang="en-US" smtClean="0"/>
+              <a:rPr lang="en-US"/>
               <a:t>Click to edit Master title style</a:t>
             </a:r>
             <a:endParaRPr lang="en-US" dirty="0"/>
@@ -1255,7 +1260,7 @@
           <a:p>
             <a:pPr lvl="0"/>
             <a:r>
-              <a:rPr lang="en-US" smtClean="0"/>
+              <a:rPr lang="en-US"/>
               <a:t>Click to edit Master text styles</a:t>
             </a:r>
           </a:p>
@@ -1377,7 +1382,7 @@
           <a:p>
             <a:pPr lvl="0"/>
             <a:r>
-              <a:rPr lang="en-US" smtClean="0"/>
+              <a:rPr lang="en-US"/>
               <a:t>Click to edit Master text styles</a:t>
             </a:r>
           </a:p>
@@ -1595,7 +1600,7 @@
           </a:lstStyle>
           <a:p>
             <a:r>
-              <a:rPr lang="en-US" smtClean="0"/>
+              <a:rPr lang="en-US"/>
               <a:t>Click to edit Master title style</a:t>
             </a:r>
             <a:endParaRPr lang="en-US" dirty="0"/>
@@ -1718,7 +1723,7 @@
           <a:p>
             <a:pPr lvl="0"/>
             <a:r>
-              <a:rPr lang="en-US" smtClean="0"/>
+              <a:rPr lang="en-US"/>
               <a:t>Click to edit Master text styles</a:t>
             </a:r>
           </a:p>
@@ -1846,7 +1851,7 @@
           </a:lstStyle>
           <a:p>
             <a:r>
-              <a:rPr lang="en-US" smtClean="0"/>
+              <a:rPr lang="en-US"/>
               <a:t>Click to edit Master title style</a:t>
             </a:r>
             <a:endParaRPr lang="en-US" dirty="0"/>
@@ -1910,7 +1915,7 @@
           <a:p>
             <a:pPr lvl="0"/>
             <a:r>
-              <a:rPr lang="en-US" smtClean="0"/>
+              <a:rPr lang="en-US"/>
               <a:t>Click to edit Master text styles</a:t>
             </a:r>
           </a:p>
@@ -2032,7 +2037,7 @@
           <a:p>
             <a:pPr lvl="0"/>
             <a:r>
-              <a:rPr lang="en-US" smtClean="0"/>
+              <a:rPr lang="en-US"/>
               <a:t>Click to edit Master text styles</a:t>
             </a:r>
           </a:p>
@@ -2242,7 +2247,7 @@
           </a:lstStyle>
           <a:p>
             <a:r>
-              <a:rPr lang="en-US" smtClean="0"/>
+              <a:rPr lang="en-US"/>
               <a:t>Click to edit Master title style</a:t>
             </a:r>
             <a:endParaRPr lang="en-US" dirty="0"/>
@@ -2303,7 +2308,7 @@
           <a:p>
             <a:pPr lvl="0"/>
             <a:r>
-              <a:rPr lang="en-US" smtClean="0"/>
+              <a:rPr lang="en-US"/>
               <a:t>Click to edit Master text styles</a:t>
             </a:r>
           </a:p>
@@ -2425,7 +2430,7 @@
           <a:p>
             <a:pPr lvl="0"/>
             <a:r>
-              <a:rPr lang="en-US" smtClean="0"/>
+              <a:rPr lang="en-US"/>
               <a:t>Click to edit Master text styles</a:t>
             </a:r>
           </a:p>
@@ -2542,7 +2547,7 @@
           <a:lstStyle/>
           <a:p>
             <a:r>
-              <a:rPr lang="en-US" smtClean="0"/>
+              <a:rPr lang="en-US"/>
               <a:t>Click to edit Master title style</a:t>
             </a:r>
             <a:endParaRPr lang="en-US" dirty="0"/>
@@ -2566,35 +2571,35 @@
           <a:p>
             <a:pPr lvl="0"/>
             <a:r>
-              <a:rPr lang="en-US" smtClean="0"/>
+              <a:rPr lang="en-US"/>
               <a:t>Click to edit Master text styles</a:t>
             </a:r>
           </a:p>
           <a:p>
             <a:pPr lvl="1"/>
             <a:r>
-              <a:rPr lang="en-US" smtClean="0"/>
+              <a:rPr lang="en-US"/>
               <a:t>Second level</a:t>
             </a:r>
           </a:p>
           <a:p>
             <a:pPr lvl="2"/>
             <a:r>
-              <a:rPr lang="en-US" smtClean="0"/>
+              <a:rPr lang="en-US"/>
               <a:t>Third level</a:t>
             </a:r>
           </a:p>
           <a:p>
             <a:pPr lvl="3"/>
             <a:r>
-              <a:rPr lang="en-US" smtClean="0"/>
+              <a:rPr lang="en-US"/>
               <a:t>Fourth level</a:t>
             </a:r>
           </a:p>
           <a:p>
             <a:pPr lvl="4"/>
             <a:r>
-              <a:rPr lang="en-US" smtClean="0"/>
+              <a:rPr lang="en-US"/>
               <a:t>Fifth level</a:t>
             </a:r>
             <a:endParaRPr lang="en-US" dirty="0"/>
@@ -2717,7 +2722,7 @@
           <a:lstStyle/>
           <a:p>
             <a:r>
-              <a:rPr lang="en-US" smtClean="0"/>
+              <a:rPr lang="en-US"/>
               <a:t>Click to edit Master title style</a:t>
             </a:r>
             <a:endParaRPr lang="en-US" dirty="0"/>
@@ -2746,35 +2751,35 @@
           <a:p>
             <a:pPr lvl="0"/>
             <a:r>
-              <a:rPr lang="en-US" smtClean="0"/>
+              <a:rPr lang="en-US"/>
               <a:t>Click to edit Master text styles</a:t>
             </a:r>
           </a:p>
           <a:p>
             <a:pPr lvl="1"/>
             <a:r>
-              <a:rPr lang="en-US" smtClean="0"/>
+              <a:rPr lang="en-US"/>
               <a:t>Second level</a:t>
             </a:r>
           </a:p>
           <a:p>
             <a:pPr lvl="2"/>
             <a:r>
-              <a:rPr lang="en-US" smtClean="0"/>
+              <a:rPr lang="en-US"/>
               <a:t>Third level</a:t>
             </a:r>
           </a:p>
           <a:p>
             <a:pPr lvl="3"/>
             <a:r>
-              <a:rPr lang="en-US" smtClean="0"/>
+              <a:rPr lang="en-US"/>
               <a:t>Fourth level</a:t>
             </a:r>
           </a:p>
           <a:p>
             <a:pPr lvl="4"/>
             <a:r>
-              <a:rPr lang="en-US" smtClean="0"/>
+              <a:rPr lang="en-US"/>
               <a:t>Fifth level</a:t>
             </a:r>
             <a:endParaRPr lang="en-US" dirty="0"/>
@@ -2898,7 +2903,7 @@
           </a:lstStyle>
           <a:p>
             <a:r>
-              <a:rPr lang="en-US" smtClean="0"/>
+              <a:rPr lang="en-US"/>
               <a:t>Click to edit Master title style</a:t>
             </a:r>
             <a:endParaRPr lang="en-US" dirty="0"/>
@@ -2922,35 +2927,35 @@
           <a:p>
             <a:pPr lvl="0"/>
             <a:r>
-              <a:rPr lang="en-US" smtClean="0"/>
+              <a:rPr lang="en-US"/>
               <a:t>Click to edit Master text styles</a:t>
             </a:r>
           </a:p>
           <a:p>
             <a:pPr lvl="1"/>
             <a:r>
-              <a:rPr lang="en-US" smtClean="0"/>
+              <a:rPr lang="en-US"/>
               <a:t>Second level</a:t>
             </a:r>
           </a:p>
           <a:p>
             <a:pPr lvl="2"/>
             <a:r>
-              <a:rPr lang="en-US" smtClean="0"/>
+              <a:rPr lang="en-US"/>
               <a:t>Third level</a:t>
             </a:r>
           </a:p>
           <a:p>
             <a:pPr lvl="3"/>
             <a:r>
-              <a:rPr lang="en-US" smtClean="0"/>
+              <a:rPr lang="en-US"/>
               <a:t>Fourth level</a:t>
             </a:r>
           </a:p>
           <a:p>
             <a:pPr lvl="4"/>
             <a:r>
-              <a:rPr lang="en-US" smtClean="0"/>
+              <a:rPr lang="en-US"/>
               <a:t>Fifth level</a:t>
             </a:r>
             <a:endParaRPr lang="en-US" dirty="0"/>
@@ -3077,7 +3082,7 @@
           </a:lstStyle>
           <a:p>
             <a:r>
-              <a:rPr lang="en-US" smtClean="0"/>
+              <a:rPr lang="en-US"/>
               <a:t>Click to edit Master title style</a:t>
             </a:r>
             <a:endParaRPr lang="en-US" dirty="0"/>
@@ -3198,7 +3203,7 @@
           <a:p>
             <a:pPr lvl="0"/>
             <a:r>
-              <a:rPr lang="en-US" smtClean="0"/>
+              <a:rPr lang="en-US"/>
               <a:t>Click to edit Master text styles</a:t>
             </a:r>
           </a:p>
@@ -3315,7 +3320,7 @@
           <a:lstStyle/>
           <a:p>
             <a:r>
-              <a:rPr lang="en-US" smtClean="0"/>
+              <a:rPr lang="en-US"/>
               <a:t>Click to edit Master title style</a:t>
             </a:r>
             <a:endParaRPr lang="en-US" dirty="0"/>
@@ -3344,35 +3349,35 @@
           <a:p>
             <a:pPr lvl="0"/>
             <a:r>
-              <a:rPr lang="en-US" smtClean="0"/>
+              <a:rPr lang="en-US"/>
               <a:t>Click to edit Master text styles</a:t>
             </a:r>
           </a:p>
           <a:p>
             <a:pPr lvl="1"/>
             <a:r>
-              <a:rPr lang="en-US" smtClean="0"/>
+              <a:rPr lang="en-US"/>
               <a:t>Second level</a:t>
             </a:r>
           </a:p>
           <a:p>
             <a:pPr lvl="2"/>
             <a:r>
-              <a:rPr lang="en-US" smtClean="0"/>
+              <a:rPr lang="en-US"/>
               <a:t>Third level</a:t>
             </a:r>
           </a:p>
           <a:p>
             <a:pPr lvl="3"/>
             <a:r>
-              <a:rPr lang="en-US" smtClean="0"/>
+              <a:rPr lang="en-US"/>
               <a:t>Fourth level</a:t>
             </a:r>
           </a:p>
           <a:p>
             <a:pPr lvl="4"/>
             <a:r>
-              <a:rPr lang="en-US" smtClean="0"/>
+              <a:rPr lang="en-US"/>
               <a:t>Fifth level</a:t>
             </a:r>
             <a:endParaRPr lang="en-US" dirty="0"/>
@@ -3401,35 +3406,35 @@
           <a:p>
             <a:pPr lvl="0"/>
             <a:r>
-              <a:rPr lang="en-US" smtClean="0"/>
+              <a:rPr lang="en-US"/>
               <a:t>Click to edit Master text styles</a:t>
             </a:r>
           </a:p>
           <a:p>
             <a:pPr lvl="1"/>
             <a:r>
-              <a:rPr lang="en-US" smtClean="0"/>
+              <a:rPr lang="en-US"/>
               <a:t>Second level</a:t>
             </a:r>
           </a:p>
           <a:p>
             <a:pPr lvl="2"/>
             <a:r>
-              <a:rPr lang="en-US" smtClean="0"/>
+              <a:rPr lang="en-US"/>
               <a:t>Third level</a:t>
             </a:r>
           </a:p>
           <a:p>
             <a:pPr lvl="3"/>
             <a:r>
-              <a:rPr lang="en-US" smtClean="0"/>
+              <a:rPr lang="en-US"/>
               <a:t>Fourth level</a:t>
             </a:r>
           </a:p>
           <a:p>
             <a:pPr lvl="4"/>
             <a:r>
-              <a:rPr lang="en-US" smtClean="0"/>
+              <a:rPr lang="en-US"/>
               <a:t>Fifth level</a:t>
             </a:r>
             <a:endParaRPr lang="en-US" dirty="0"/>
@@ -3551,7 +3556,7 @@
           </a:lstStyle>
           <a:p>
             <a:r>
-              <a:rPr lang="en-US" smtClean="0"/>
+              <a:rPr lang="en-US"/>
               <a:t>Click to edit Master title style</a:t>
             </a:r>
             <a:endParaRPr lang="en-US" dirty="0"/>
@@ -3619,7 +3624,7 @@
           <a:p>
             <a:pPr lvl="0"/>
             <a:r>
-              <a:rPr lang="en-US" smtClean="0"/>
+              <a:rPr lang="en-US"/>
               <a:t>Click to edit Master text styles</a:t>
             </a:r>
           </a:p>
@@ -3649,35 +3654,35 @@
           <a:p>
             <a:pPr lvl="0"/>
             <a:r>
-              <a:rPr lang="en-US" smtClean="0"/>
+              <a:rPr lang="en-US"/>
               <a:t>Click to edit Master text styles</a:t>
             </a:r>
           </a:p>
           <a:p>
             <a:pPr lvl="1"/>
             <a:r>
-              <a:rPr lang="en-US" smtClean="0"/>
+              <a:rPr lang="en-US"/>
               <a:t>Second level</a:t>
             </a:r>
           </a:p>
           <a:p>
             <a:pPr lvl="2"/>
             <a:r>
-              <a:rPr lang="en-US" smtClean="0"/>
+              <a:rPr lang="en-US"/>
               <a:t>Third level</a:t>
             </a:r>
           </a:p>
           <a:p>
             <a:pPr lvl="3"/>
             <a:r>
-              <a:rPr lang="en-US" smtClean="0"/>
+              <a:rPr lang="en-US"/>
               <a:t>Fourth level</a:t>
             </a:r>
           </a:p>
           <a:p>
             <a:pPr lvl="4"/>
             <a:r>
-              <a:rPr lang="en-US" smtClean="0"/>
+              <a:rPr lang="en-US"/>
               <a:t>Fifth level</a:t>
             </a:r>
             <a:endParaRPr lang="en-US" dirty="0"/>
@@ -3745,7 +3750,7 @@
           <a:p>
             <a:pPr lvl="0"/>
             <a:r>
-              <a:rPr lang="en-US" smtClean="0"/>
+              <a:rPr lang="en-US"/>
               <a:t>Click to edit Master text styles</a:t>
             </a:r>
           </a:p>
@@ -3775,35 +3780,35 @@
           <a:p>
             <a:pPr lvl="0"/>
             <a:r>
-              <a:rPr lang="en-US" smtClean="0"/>
+              <a:rPr lang="en-US"/>
               <a:t>Click to edit Master text styles</a:t>
             </a:r>
           </a:p>
           <a:p>
             <a:pPr lvl="1"/>
             <a:r>
-              <a:rPr lang="en-US" smtClean="0"/>
+              <a:rPr lang="en-US"/>
               <a:t>Second level</a:t>
             </a:r>
           </a:p>
           <a:p>
             <a:pPr lvl="2"/>
             <a:r>
-              <a:rPr lang="en-US" smtClean="0"/>
+              <a:rPr lang="en-US"/>
               <a:t>Third level</a:t>
             </a:r>
           </a:p>
           <a:p>
             <a:pPr lvl="3"/>
             <a:r>
-              <a:rPr lang="en-US" smtClean="0"/>
+              <a:rPr lang="en-US"/>
               <a:t>Fourth level</a:t>
             </a:r>
           </a:p>
           <a:p>
             <a:pPr lvl="4"/>
             <a:r>
-              <a:rPr lang="en-US" smtClean="0"/>
+              <a:rPr lang="en-US"/>
               <a:t>Fifth level</a:t>
             </a:r>
             <a:endParaRPr lang="en-US" dirty="0"/>
@@ -3926,7 +3931,7 @@
           <a:lstStyle/>
           <a:p>
             <a:r>
-              <a:rPr lang="en-US" smtClean="0"/>
+              <a:rPr lang="en-US"/>
               <a:t>Click to edit Master title style</a:t>
             </a:r>
             <a:endParaRPr lang="en-US" dirty="0"/>
@@ -4150,7 +4155,7 @@
           </a:lstStyle>
           <a:p>
             <a:r>
-              <a:rPr lang="en-US" smtClean="0"/>
+              <a:rPr lang="en-US"/>
               <a:t>Click to edit Master title style</a:t>
             </a:r>
             <a:endParaRPr lang="en-US" dirty="0"/>
@@ -4181,35 +4186,35 @@
           <a:p>
             <a:pPr lvl="0"/>
             <a:r>
-              <a:rPr lang="en-US" smtClean="0"/>
+              <a:rPr lang="en-US"/>
               <a:t>Click to edit Master text styles</a:t>
             </a:r>
           </a:p>
           <a:p>
             <a:pPr lvl="1"/>
             <a:r>
-              <a:rPr lang="en-US" smtClean="0"/>
+              <a:rPr lang="en-US"/>
               <a:t>Second level</a:t>
             </a:r>
           </a:p>
           <a:p>
             <a:pPr lvl="2"/>
             <a:r>
-              <a:rPr lang="en-US" smtClean="0"/>
+              <a:rPr lang="en-US"/>
               <a:t>Third level</a:t>
             </a:r>
           </a:p>
           <a:p>
             <a:pPr lvl="3"/>
             <a:r>
-              <a:rPr lang="en-US" smtClean="0"/>
+              <a:rPr lang="en-US"/>
               <a:t>Fourth level</a:t>
             </a:r>
           </a:p>
           <a:p>
             <a:pPr lvl="4"/>
             <a:r>
-              <a:rPr lang="en-US" smtClean="0"/>
+              <a:rPr lang="en-US"/>
               <a:t>Fifth level</a:t>
             </a:r>
             <a:endParaRPr lang="en-US" dirty="0"/>
@@ -4277,7 +4282,7 @@
           <a:p>
             <a:pPr lvl="0"/>
             <a:r>
-              <a:rPr lang="en-US" smtClean="0"/>
+              <a:rPr lang="en-US"/>
               <a:t>Click to edit Master text styles</a:t>
             </a:r>
           </a:p>
@@ -4405,7 +4410,7 @@
           </a:lstStyle>
           <a:p>
             <a:r>
-              <a:rPr lang="en-US" smtClean="0"/>
+              <a:rPr lang="en-US"/>
               <a:t>Click to edit Master title style</a:t>
             </a:r>
             <a:endParaRPr lang="en-US" dirty="0"/>
@@ -4472,7 +4477,7 @@
           </a:lstStyle>
           <a:p>
             <a:r>
-              <a:rPr lang="en-US" smtClean="0"/>
+              <a:rPr lang="en-US"/>
               <a:t>Click icon to add picture</a:t>
             </a:r>
             <a:endParaRPr lang="en-US" dirty="0"/>
@@ -4540,7 +4545,7 @@
           <a:p>
             <a:pPr lvl="0"/>
             <a:r>
-              <a:rPr lang="en-US" smtClean="0"/>
+              <a:rPr lang="en-US"/>
               <a:t>Click to edit Master text styles</a:t>
             </a:r>
           </a:p>
@@ -5202,7 +5207,7 @@
           <a:lstStyle/>
           <a:p>
             <a:r>
-              <a:rPr lang="en-US" smtClean="0"/>
+              <a:rPr lang="en-US"/>
               <a:t>Click to edit Master title style</a:t>
             </a:r>
             <a:endParaRPr lang="en-US" dirty="0"/>
@@ -5236,35 +5241,35 @@
           <a:p>
             <a:pPr lvl="0"/>
             <a:r>
-              <a:rPr lang="en-US" smtClean="0"/>
+              <a:rPr lang="en-US"/>
               <a:t>Click to edit Master text styles</a:t>
             </a:r>
           </a:p>
           <a:p>
             <a:pPr lvl="1"/>
             <a:r>
-              <a:rPr lang="en-US" smtClean="0"/>
+              <a:rPr lang="en-US"/>
               <a:t>Second level</a:t>
             </a:r>
           </a:p>
           <a:p>
             <a:pPr lvl="2"/>
             <a:r>
-              <a:rPr lang="en-US" smtClean="0"/>
+              <a:rPr lang="en-US"/>
               <a:t>Third level</a:t>
             </a:r>
           </a:p>
           <a:p>
             <a:pPr lvl="3"/>
             <a:r>
-              <a:rPr lang="en-US" smtClean="0"/>
+              <a:rPr lang="en-US"/>
               <a:t>Fourth level</a:t>
             </a:r>
           </a:p>
           <a:p>
             <a:pPr lvl="4"/>
             <a:r>
-              <a:rPr lang="en-US" smtClean="0"/>
+              <a:rPr lang="en-US"/>
               <a:t>Fifth level</a:t>
             </a:r>
             <a:endParaRPr lang="en-US" dirty="0"/>
@@ -5846,10 +5851,9 @@
           <a:lstStyle/>
           <a:p>
             <a:r>
-              <a:rPr lang="en-GB" dirty="0" smtClean="0"/>
+              <a:rPr lang="en-GB" dirty="0"/>
               <a:t>Group 14</a:t>
             </a:r>
-            <a:endParaRPr lang="en-GB" dirty="0"/>
           </a:p>
         </p:txBody>
       </p:sp>
@@ -5869,35 +5873,35 @@
           <a:lstStyle/>
           <a:p>
             <a:r>
-              <a:rPr lang="en-GB" dirty="0" smtClean="0"/>
+              <a:rPr lang="en-GB" dirty="0"/>
               <a:t>Alex </a:t>
             </a:r>
             <a:r>
-              <a:rPr lang="en-GB" dirty="0" err="1" smtClean="0"/>
+              <a:rPr lang="en-GB" dirty="0" err="1"/>
               <a:t>Polley</a:t>
             </a:r>
             <a:r>
-              <a:rPr lang="en-GB" dirty="0" smtClean="0"/>
+              <a:rPr lang="en-GB" dirty="0"/>
               <a:t>, Ryan </a:t>
             </a:r>
             <a:r>
-              <a:rPr lang="en-GB" dirty="0" err="1" smtClean="0"/>
+              <a:rPr lang="en-GB" dirty="0" err="1"/>
               <a:t>Manthorp</a:t>
             </a:r>
             <a:r>
-              <a:rPr lang="en-GB" dirty="0" smtClean="0"/>
+              <a:rPr lang="en-GB" dirty="0"/>
               <a:t>, Daniel </a:t>
             </a:r>
             <a:r>
-              <a:rPr lang="en-GB" dirty="0" err="1" smtClean="0"/>
+              <a:rPr lang="en-GB" dirty="0" err="1"/>
               <a:t>Pokladek</a:t>
             </a:r>
             <a:r>
-              <a:rPr lang="en-GB" dirty="0" smtClean="0"/>
+              <a:rPr lang="en-GB" dirty="0"/>
               <a:t>, Tom </a:t>
             </a:r>
             <a:r>
-              <a:rPr lang="en-GB" dirty="0" err="1" smtClean="0"/>
+              <a:rPr lang="en-GB" dirty="0" err="1"/>
               <a:t>Mclaren</a:t>
             </a:r>
             <a:endParaRPr lang="en-GB" dirty="0"/>
@@ -5950,10 +5954,9 @@
           <a:lstStyle/>
           <a:p>
             <a:r>
-              <a:rPr lang="en-GB" dirty="0" smtClean="0"/>
+              <a:rPr lang="en-GB" dirty="0"/>
               <a:t>Logline</a:t>
             </a:r>
-            <a:endParaRPr lang="en-GB" dirty="0"/>
           </a:p>
         </p:txBody>
       </p:sp>
@@ -5973,10 +5976,9 @@
           <a:lstStyle/>
           <a:p>
             <a:r>
-              <a:rPr lang="en-GB" dirty="0" smtClean="0"/>
+              <a:rPr lang="en-GB" dirty="0"/>
               <a:t>A librarian, a bookshop in space, alien bookworms trying to destroy history, Kill worms to save earth</a:t>
             </a:r>
-            <a:endParaRPr lang="en-GB" dirty="0"/>
           </a:p>
         </p:txBody>
       </p:sp>
@@ -6026,31 +6028,46 @@
           <a:lstStyle/>
           <a:p>
             <a:r>
-              <a:rPr lang="en-GB" dirty="0" smtClean="0"/>
+              <a:rPr lang="en-GB" dirty="0"/>
               <a:t>Emotions/ Introduction</a:t>
             </a:r>
+          </a:p>
+        </p:txBody>
+      </p:sp>
+      <p:sp>
+        <p:nvSpPr>
+          <p:cNvPr id="3" name="Content Placeholder 2"/>
+          <p:cNvSpPr>
+            <a:spLocks noGrp="1"/>
+          </p:cNvSpPr>
+          <p:nvPr>
+            <p:ph idx="1"/>
+          </p:nvPr>
+        </p:nvSpPr>
+        <p:spPr/>
+        <p:txBody>
+          <a:bodyPr/>
+          <a:lstStyle/>
+          <a:p>
+            <a:r>
+              <a:rPr lang="en-GB" dirty="0" err="1"/>
+              <a:t>Monachopsis</a:t>
+            </a:r>
             <a:endParaRPr lang="en-GB" dirty="0"/>
           </a:p>
-        </p:txBody>
-      </p:sp>
-      <p:sp>
-        <p:nvSpPr>
-          <p:cNvPr id="3" name="Content Placeholder 2"/>
-          <p:cNvSpPr>
-            <a:spLocks noGrp="1"/>
-          </p:cNvSpPr>
-          <p:nvPr>
-            <p:ph idx="1"/>
-          </p:nvPr>
-        </p:nvSpPr>
-        <p:spPr/>
-        <p:txBody>
-          <a:bodyPr/>
-          <a:lstStyle/>
-          <a:p>
-            <a:r>
-              <a:rPr lang="en-GB" dirty="0" err="1" smtClean="0"/>
-              <a:t>Monachopsis</a:t>
+          <a:p>
+            <a:pPr marL="0" indent="0">
+              <a:buNone/>
+            </a:pPr>
+            <a:r>
+              <a:rPr lang="en-GB" dirty="0"/>
+              <a:t>Achieved by having subtle hints that this bookshop is out of place</a:t>
+            </a:r>
+          </a:p>
+          <a:p>
+            <a:r>
+              <a:rPr lang="en-GB" dirty="0" err="1"/>
+              <a:t>Vellichor</a:t>
             </a:r>
             <a:endParaRPr lang="en-GB" dirty="0"/>
           </a:p>
@@ -6059,30 +6076,9 @@
               <a:buNone/>
             </a:pPr>
             <a:r>
-              <a:rPr lang="en-GB" dirty="0" smtClean="0"/>
-              <a:t>Achieved by having subtle hints that this bookshop is out of place</a:t>
-            </a:r>
-          </a:p>
-          <a:p>
-            <a:r>
-              <a:rPr lang="en-GB" dirty="0" err="1" smtClean="0"/>
-              <a:t>Vellichor</a:t>
-            </a:r>
-            <a:endParaRPr lang="en-GB" dirty="0" smtClean="0"/>
-          </a:p>
-          <a:p>
-            <a:pPr marL="0" indent="0">
-              <a:buNone/>
-            </a:pPr>
-            <a:r>
-              <a:rPr lang="en-GB" dirty="0" smtClean="0"/>
-              <a:t>Achieved by showing vintage décor and artwork </a:t>
-            </a:r>
-            <a:r>
-              <a:rPr lang="en-GB" smtClean="0"/>
-              <a:t>of bookshop</a:t>
-            </a:r>
-            <a:endParaRPr lang="en-GB" dirty="0"/>
+              <a:rPr lang="en-GB" dirty="0"/>
+              <a:t>Achieved by showing vintage décor and artwork of bookshop</a:t>
+            </a:r>
           </a:p>
         </p:txBody>
       </p:sp>
@@ -6132,10 +6128,9 @@
           <a:lstStyle/>
           <a:p>
             <a:r>
-              <a:rPr lang="en-GB" dirty="0" smtClean="0"/>
+              <a:rPr lang="en-GB" dirty="0"/>
               <a:t>What does the player do?</a:t>
             </a:r>
-            <a:endParaRPr lang="en-GB" dirty="0"/>
           </a:p>
         </p:txBody>
       </p:sp>
@@ -6155,21 +6150,23 @@
           <a:lstStyle/>
           <a:p>
             <a:r>
-              <a:rPr lang="en-GB" dirty="0" smtClean="0"/>
+              <a:rPr lang="en-GB" dirty="0"/>
               <a:t>The player will be moving books with the mouse</a:t>
             </a:r>
           </a:p>
           <a:p>
             <a:r>
-              <a:rPr lang="en-GB" dirty="0" smtClean="0"/>
+              <a:rPr lang="en-GB" dirty="0"/>
               <a:t>Player will sort books in chronological order and size</a:t>
             </a:r>
           </a:p>
           <a:p>
             <a:r>
-              <a:rPr lang="en-GB" dirty="0" smtClean="0"/>
+              <a:rPr lang="en-GB" dirty="0"/>
               <a:t>The player will also shoot enemies/ worms with lasers</a:t>
             </a:r>
+          </a:p>
+          <a:p>
             <a:endParaRPr lang="en-GB" dirty="0"/>
           </a:p>
         </p:txBody>
@@ -6220,7 +6217,7 @@
           <a:lstStyle/>
           <a:p>
             <a:r>
-              <a:rPr lang="en-GB" dirty="0" err="1" smtClean="0"/>
+              <a:rPr lang="en-GB" dirty="0" err="1"/>
               <a:t>Moodboards</a:t>
             </a:r>
             <a:endParaRPr lang="en-GB" dirty="0"/>
@@ -6292,10 +6289,9 @@
           <a:lstStyle/>
           <a:p>
             <a:r>
-              <a:rPr lang="en-GB" dirty="0" smtClean="0"/>
+              <a:rPr lang="en-GB" dirty="0"/>
               <a:t>Mechanics</a:t>
             </a:r>
-            <a:endParaRPr lang="en-GB" dirty="0"/>
           </a:p>
         </p:txBody>
       </p:sp>
@@ -6364,29 +6360,40 @@
           <a:lstStyle/>
           <a:p>
             <a:r>
-              <a:rPr lang="en-GB" dirty="0" smtClean="0"/>
+              <a:rPr lang="en-GB" dirty="0"/>
               <a:t>Art Style</a:t>
             </a:r>
+          </a:p>
+        </p:txBody>
+      </p:sp>
+      <p:sp>
+        <p:nvSpPr>
+          <p:cNvPr id="3" name="Content Placeholder 2"/>
+          <p:cNvSpPr>
+            <a:spLocks noGrp="1"/>
+          </p:cNvSpPr>
+          <p:nvPr>
+            <p:ph idx="1"/>
+          </p:nvPr>
+        </p:nvSpPr>
+        <p:spPr/>
+        <p:txBody>
+          <a:bodyPr/>
+          <a:lstStyle/>
+          <a:p>
+            <a:r>
+              <a:rPr lang="en-GB" dirty="0"/>
+              <a:t>The art style is still yet to be decided</a:t>
+            </a:r>
+          </a:p>
+          <a:p>
+            <a:r>
+              <a:rPr lang="en-GB" dirty="0"/>
+              <a:t>The style will however be consistent in various assets throughout the game</a:t>
+            </a:r>
+          </a:p>
+          <a:p>
             <a:endParaRPr lang="en-GB" dirty="0"/>
-          </a:p>
-        </p:txBody>
-      </p:sp>
-      <p:sp>
-        <p:nvSpPr>
-          <p:cNvPr id="3" name="Content Placeholder 2"/>
-          <p:cNvSpPr>
-            <a:spLocks noGrp="1"/>
-          </p:cNvSpPr>
-          <p:nvPr>
-            <p:ph idx="1"/>
-          </p:nvPr>
-        </p:nvSpPr>
-        <p:spPr/>
-        <p:txBody>
-          <a:bodyPr/>
-          <a:lstStyle/>
-          <a:p>
-            <a:endParaRPr lang="en-GB"/>
           </a:p>
         </p:txBody>
       </p:sp>

</xml_diff>

<commit_message>
Added project management slide
Updated my slide and added slide with emails sent and general admin.
</commit_message>
<xml_diff>
--- a/Group 14.pptx
+++ b/Group 14.pptx
@@ -12,6 +12,7 @@
     <p:sldId id="261" r:id="rId6"/>
     <p:sldId id="258" r:id="rId7"/>
     <p:sldId id="260" r:id="rId8"/>
+    <p:sldId id="265" r:id="rId9"/>
   </p:sldIdLst>
   <p:sldSz cx="12192000" cy="6858000"/>
   <p:notesSz cx="6858000" cy="9144000"/>
@@ -112,7 +113,18 @@
   </p:defaultTextStyle>
   <p:extLst>
     <p:ext uri="{EFAFB233-063F-42B5-8137-9DF3F51BA10A}">
-      <p15:sldGuideLst xmlns:p15="http://schemas.microsoft.com/office/powerpoint/2012/main" xmlns=""/>
+      <p15:sldGuideLst xmlns:p15="http://schemas.microsoft.com/office/powerpoint/2012/main">
+        <p15:guide id="1" orient="horz" pos="2160">
+          <p15:clr>
+            <a:srgbClr val="A4A3A4"/>
+          </p15:clr>
+        </p15:guide>
+        <p15:guide id="2" pos="3840">
+          <p15:clr>
+            <a:srgbClr val="A4A3A4"/>
+          </p15:clr>
+        </p15:guide>
+      </p15:sldGuideLst>
     </p:ext>
   </p:extLst>
 </p:presentation>
@@ -841,7 +853,7 @@
             <a:fld id="{4CDA0734-6088-4A11-8A2B-97B609E3D287}" type="datetimeFigureOut">
               <a:rPr lang="en-GB" smtClean="0"/>
               <a:pPr/>
-              <a:t>17/10/2016</a:t>
+              <a:t>18/10/2016</a:t>
             </a:fld>
             <a:endParaRPr lang="en-GB"/>
           </a:p>
@@ -893,7 +905,7 @@
     </p:spTree>
     <p:extLst>
       <p:ext uri="{BB962C8B-B14F-4D97-AF65-F5344CB8AC3E}">
-        <p14:creationId xmlns:p14="http://schemas.microsoft.com/office/powerpoint/2010/main" xmlns="" val="1416213336"/>
+        <p14:creationId xmlns:p14="http://schemas.microsoft.com/office/powerpoint/2010/main" val="1416213336"/>
       </p:ext>
     </p:extLst>
   </p:cSld>
@@ -1094,7 +1106,7 @@
             <a:fld id="{4CDA0734-6088-4A11-8A2B-97B609E3D287}" type="datetimeFigureOut">
               <a:rPr lang="en-GB" smtClean="0"/>
               <a:pPr/>
-              <a:t>17/10/2016</a:t>
+              <a:t>18/10/2016</a:t>
             </a:fld>
             <a:endParaRPr lang="en-GB"/>
           </a:p>
@@ -1146,7 +1158,7 @@
     </p:spTree>
     <p:extLst>
       <p:ext uri="{BB962C8B-B14F-4D97-AF65-F5344CB8AC3E}">
-        <p14:creationId xmlns:p14="http://schemas.microsoft.com/office/powerpoint/2010/main" xmlns="" val="2996688164"/>
+        <p14:creationId xmlns:p14="http://schemas.microsoft.com/office/powerpoint/2010/main" val="2996688164"/>
       </p:ext>
     </p:extLst>
   </p:cSld>
@@ -1410,7 +1422,7 @@
             <a:fld id="{4CDA0734-6088-4A11-8A2B-97B609E3D287}" type="datetimeFigureOut">
               <a:rPr lang="en-GB" smtClean="0"/>
               <a:pPr/>
-              <a:t>17/10/2016</a:t>
+              <a:t>18/10/2016</a:t>
             </a:fld>
             <a:endParaRPr lang="en-GB"/>
           </a:p>
@@ -1552,7 +1564,7 @@
     </p:spTree>
     <p:extLst>
       <p:ext uri="{BB962C8B-B14F-4D97-AF65-F5344CB8AC3E}">
-        <p14:creationId xmlns:p14="http://schemas.microsoft.com/office/powerpoint/2010/main" xmlns="" val="628267690"/>
+        <p14:creationId xmlns:p14="http://schemas.microsoft.com/office/powerpoint/2010/main" val="628267690"/>
       </p:ext>
     </p:extLst>
   </p:cSld>
@@ -1753,7 +1765,7 @@
             <a:fld id="{4CDA0734-6088-4A11-8A2B-97B609E3D287}" type="datetimeFigureOut">
               <a:rPr lang="en-GB" smtClean="0"/>
               <a:pPr/>
-              <a:t>17/10/2016</a:t>
+              <a:t>18/10/2016</a:t>
             </a:fld>
             <a:endParaRPr lang="en-GB"/>
           </a:p>
@@ -1805,7 +1817,7 @@
     </p:spTree>
     <p:extLst>
       <p:ext uri="{BB962C8B-B14F-4D97-AF65-F5344CB8AC3E}">
-        <p14:creationId xmlns:p14="http://schemas.microsoft.com/office/powerpoint/2010/main" xmlns="" val="642880592"/>
+        <p14:creationId xmlns:p14="http://schemas.microsoft.com/office/powerpoint/2010/main" val="642880592"/>
       </p:ext>
     </p:extLst>
   </p:cSld>
@@ -2069,7 +2081,7 @@
             <a:fld id="{4CDA0734-6088-4A11-8A2B-97B609E3D287}" type="datetimeFigureOut">
               <a:rPr lang="en-GB" smtClean="0"/>
               <a:pPr/>
-              <a:t>17/10/2016</a:t>
+              <a:t>18/10/2016</a:t>
             </a:fld>
             <a:endParaRPr lang="en-GB"/>
           </a:p>
@@ -2203,7 +2215,7 @@
     </p:spTree>
     <p:extLst>
       <p:ext uri="{BB962C8B-B14F-4D97-AF65-F5344CB8AC3E}">
-        <p14:creationId xmlns:p14="http://schemas.microsoft.com/office/powerpoint/2010/main" xmlns="" val="1677234499"/>
+        <p14:creationId xmlns:p14="http://schemas.microsoft.com/office/powerpoint/2010/main" val="1677234499"/>
       </p:ext>
     </p:extLst>
   </p:cSld>
@@ -2464,7 +2476,7 @@
             <a:fld id="{4CDA0734-6088-4A11-8A2B-97B609E3D287}" type="datetimeFigureOut">
               <a:rPr lang="en-GB" smtClean="0"/>
               <a:pPr/>
-              <a:t>17/10/2016</a:t>
+              <a:t>18/10/2016</a:t>
             </a:fld>
             <a:endParaRPr lang="en-GB"/>
           </a:p>
@@ -2516,7 +2528,7 @@
     </p:spTree>
     <p:extLst>
       <p:ext uri="{BB962C8B-B14F-4D97-AF65-F5344CB8AC3E}">
-        <p14:creationId xmlns:p14="http://schemas.microsoft.com/office/powerpoint/2010/main" xmlns="" val="1214186571"/>
+        <p14:creationId xmlns:p14="http://schemas.microsoft.com/office/powerpoint/2010/main" val="1214186571"/>
       </p:ext>
     </p:extLst>
   </p:cSld>
@@ -2636,7 +2648,7 @@
             <a:fld id="{4CDA0734-6088-4A11-8A2B-97B609E3D287}" type="datetimeFigureOut">
               <a:rPr lang="en-GB" smtClean="0"/>
               <a:pPr/>
-              <a:t>17/10/2016</a:t>
+              <a:t>18/10/2016</a:t>
             </a:fld>
             <a:endParaRPr lang="en-GB"/>
           </a:p>
@@ -2688,7 +2700,7 @@
     </p:spTree>
     <p:extLst>
       <p:ext uri="{BB962C8B-B14F-4D97-AF65-F5344CB8AC3E}">
-        <p14:creationId xmlns:p14="http://schemas.microsoft.com/office/powerpoint/2010/main" xmlns="" val="333804558"/>
+        <p14:creationId xmlns:p14="http://schemas.microsoft.com/office/powerpoint/2010/main" val="333804558"/>
       </p:ext>
     </p:extLst>
   </p:cSld>
@@ -2818,7 +2830,7 @@
             <a:fld id="{4CDA0734-6088-4A11-8A2B-97B609E3D287}" type="datetimeFigureOut">
               <a:rPr lang="en-GB" smtClean="0"/>
               <a:pPr/>
-              <a:t>17/10/2016</a:t>
+              <a:t>18/10/2016</a:t>
             </a:fld>
             <a:endParaRPr lang="en-GB"/>
           </a:p>
@@ -2870,7 +2882,7 @@
     </p:spTree>
     <p:extLst>
       <p:ext uri="{BB962C8B-B14F-4D97-AF65-F5344CB8AC3E}">
-        <p14:creationId xmlns:p14="http://schemas.microsoft.com/office/powerpoint/2010/main" xmlns="" val="2904802637"/>
+        <p14:creationId xmlns:p14="http://schemas.microsoft.com/office/powerpoint/2010/main" val="2904802637"/>
       </p:ext>
     </p:extLst>
   </p:cSld>
@@ -2996,7 +3008,7 @@
             <a:fld id="{4CDA0734-6088-4A11-8A2B-97B609E3D287}" type="datetimeFigureOut">
               <a:rPr lang="en-GB" smtClean="0"/>
               <a:pPr/>
-              <a:t>17/10/2016</a:t>
+              <a:t>18/10/2016</a:t>
             </a:fld>
             <a:endParaRPr lang="en-GB"/>
           </a:p>
@@ -3048,7 +3060,7 @@
     </p:spTree>
     <p:extLst>
       <p:ext uri="{BB962C8B-B14F-4D97-AF65-F5344CB8AC3E}">
-        <p14:creationId xmlns:p14="http://schemas.microsoft.com/office/powerpoint/2010/main" xmlns="" val="1207658432"/>
+        <p14:creationId xmlns:p14="http://schemas.microsoft.com/office/powerpoint/2010/main" val="1207658432"/>
       </p:ext>
     </p:extLst>
   </p:cSld>
@@ -3245,7 +3257,7 @@
             <a:fld id="{4CDA0734-6088-4A11-8A2B-97B609E3D287}" type="datetimeFigureOut">
               <a:rPr lang="en-GB" smtClean="0"/>
               <a:pPr/>
-              <a:t>17/10/2016</a:t>
+              <a:t>18/10/2016</a:t>
             </a:fld>
             <a:endParaRPr lang="en-GB"/>
           </a:p>
@@ -3297,7 +3309,7 @@
     </p:spTree>
     <p:extLst>
       <p:ext uri="{BB962C8B-B14F-4D97-AF65-F5344CB8AC3E}">
-        <p14:creationId xmlns:p14="http://schemas.microsoft.com/office/powerpoint/2010/main" xmlns="" val="2940899993"/>
+        <p14:creationId xmlns:p14="http://schemas.microsoft.com/office/powerpoint/2010/main" val="2940899993"/>
       </p:ext>
     </p:extLst>
   </p:cSld>
@@ -3479,7 +3491,7 @@
             <a:fld id="{4CDA0734-6088-4A11-8A2B-97B609E3D287}" type="datetimeFigureOut">
               <a:rPr lang="en-GB" smtClean="0"/>
               <a:pPr/>
-              <a:t>17/10/2016</a:t>
+              <a:t>18/10/2016</a:t>
             </a:fld>
             <a:endParaRPr lang="en-GB"/>
           </a:p>
@@ -3531,7 +3543,7 @@
     </p:spTree>
     <p:extLst>
       <p:ext uri="{BB962C8B-B14F-4D97-AF65-F5344CB8AC3E}">
-        <p14:creationId xmlns:p14="http://schemas.microsoft.com/office/powerpoint/2010/main" xmlns="" val="1265992149"/>
+        <p14:creationId xmlns:p14="http://schemas.microsoft.com/office/powerpoint/2010/main" val="1265992149"/>
       </p:ext>
     </p:extLst>
   </p:cSld>
@@ -3855,7 +3867,7 @@
             <a:fld id="{4CDA0734-6088-4A11-8A2B-97B609E3D287}" type="datetimeFigureOut">
               <a:rPr lang="en-GB" smtClean="0"/>
               <a:pPr/>
-              <a:t>17/10/2016</a:t>
+              <a:t>18/10/2016</a:t>
             </a:fld>
             <a:endParaRPr lang="en-GB"/>
           </a:p>
@@ -3907,7 +3919,7 @@
     </p:spTree>
     <p:extLst>
       <p:ext uri="{BB962C8B-B14F-4D97-AF65-F5344CB8AC3E}">
-        <p14:creationId xmlns:p14="http://schemas.microsoft.com/office/powerpoint/2010/main" xmlns="" val="1711537170"/>
+        <p14:creationId xmlns:p14="http://schemas.microsoft.com/office/powerpoint/2010/main" val="1711537170"/>
       </p:ext>
     </p:extLst>
   </p:cSld>
@@ -3980,7 +3992,7 @@
             <a:fld id="{4CDA0734-6088-4A11-8A2B-97B609E3D287}" type="datetimeFigureOut">
               <a:rPr lang="en-GB" smtClean="0"/>
               <a:pPr/>
-              <a:t>17/10/2016</a:t>
+              <a:t>18/10/2016</a:t>
             </a:fld>
             <a:endParaRPr lang="en-GB"/>
           </a:p>
@@ -4032,7 +4044,7 @@
     </p:spTree>
     <p:extLst>
       <p:ext uri="{BB962C8B-B14F-4D97-AF65-F5344CB8AC3E}">
-        <p14:creationId xmlns:p14="http://schemas.microsoft.com/office/powerpoint/2010/main" xmlns="" val="3089190593"/>
+        <p14:creationId xmlns:p14="http://schemas.microsoft.com/office/powerpoint/2010/main" val="3089190593"/>
       </p:ext>
     </p:extLst>
   </p:cSld>
@@ -4077,7 +4089,7 @@
             <a:fld id="{4CDA0734-6088-4A11-8A2B-97B609E3D287}" type="datetimeFigureOut">
               <a:rPr lang="en-GB" smtClean="0"/>
               <a:pPr/>
-              <a:t>17/10/2016</a:t>
+              <a:t>18/10/2016</a:t>
             </a:fld>
             <a:endParaRPr lang="en-GB"/>
           </a:p>
@@ -4129,7 +4141,7 @@
     </p:spTree>
     <p:extLst>
       <p:ext uri="{BB962C8B-B14F-4D97-AF65-F5344CB8AC3E}">
-        <p14:creationId xmlns:p14="http://schemas.microsoft.com/office/powerpoint/2010/main" xmlns="" val="2521303672"/>
+        <p14:creationId xmlns:p14="http://schemas.microsoft.com/office/powerpoint/2010/main" val="2521303672"/>
       </p:ext>
     </p:extLst>
   </p:cSld>
@@ -4334,7 +4346,7 @@
             <a:fld id="{4CDA0734-6088-4A11-8A2B-97B609E3D287}" type="datetimeFigureOut">
               <a:rPr lang="en-GB" smtClean="0"/>
               <a:pPr/>
-              <a:t>17/10/2016</a:t>
+              <a:t>18/10/2016</a:t>
             </a:fld>
             <a:endParaRPr lang="en-GB"/>
           </a:p>
@@ -4386,7 +4398,7 @@
     </p:spTree>
     <p:extLst>
       <p:ext uri="{BB962C8B-B14F-4D97-AF65-F5344CB8AC3E}">
-        <p14:creationId xmlns:p14="http://schemas.microsoft.com/office/powerpoint/2010/main" xmlns="" val="1529297431"/>
+        <p14:creationId xmlns:p14="http://schemas.microsoft.com/office/powerpoint/2010/main" val="1529297431"/>
       </p:ext>
     </p:extLst>
   </p:cSld>
@@ -4599,7 +4611,7 @@
             <a:fld id="{4CDA0734-6088-4A11-8A2B-97B609E3D287}" type="datetimeFigureOut">
               <a:rPr lang="en-GB" smtClean="0"/>
               <a:pPr/>
-              <a:t>17/10/2016</a:t>
+              <a:t>18/10/2016</a:t>
             </a:fld>
             <a:endParaRPr lang="en-GB"/>
           </a:p>
@@ -4651,7 +4663,7 @@
     </p:spTree>
     <p:extLst>
       <p:ext uri="{BB962C8B-B14F-4D97-AF65-F5344CB8AC3E}">
-        <p14:creationId xmlns:p14="http://schemas.microsoft.com/office/powerpoint/2010/main" xmlns="" val="4047318941"/>
+        <p14:creationId xmlns:p14="http://schemas.microsoft.com/office/powerpoint/2010/main" val="4047318941"/>
       </p:ext>
     </p:extLst>
   </p:cSld>
@@ -5344,7 +5356,7 @@
             <a:fld id="{4CDA0734-6088-4A11-8A2B-97B609E3D287}" type="datetimeFigureOut">
               <a:rPr lang="en-GB" smtClean="0"/>
               <a:pPr/>
-              <a:t>17/10/2016</a:t>
+              <a:t>18/10/2016</a:t>
             </a:fld>
             <a:endParaRPr lang="en-GB"/>
           </a:p>
@@ -5430,7 +5442,7 @@
     </p:spTree>
     <p:extLst>
       <p:ext uri="{BB962C8B-B14F-4D97-AF65-F5344CB8AC3E}">
-        <p14:creationId xmlns:p14="http://schemas.microsoft.com/office/powerpoint/2010/main" xmlns="" val="4120066486"/>
+        <p14:creationId xmlns:p14="http://schemas.microsoft.com/office/powerpoint/2010/main" val="4120066486"/>
       </p:ext>
     </p:extLst>
   </p:cSld>
@@ -5945,7 +5957,7 @@
     </p:spTree>
     <p:extLst>
       <p:ext uri="{BB962C8B-B14F-4D97-AF65-F5344CB8AC3E}">
-        <p14:creationId xmlns:p14="http://schemas.microsoft.com/office/powerpoint/2010/main" xmlns="" val="384790399"/>
+        <p14:creationId xmlns:p14="http://schemas.microsoft.com/office/powerpoint/2010/main" val="384790399"/>
       </p:ext>
     </p:extLst>
   </p:cSld>
@@ -5988,10 +6000,9 @@
           <a:lstStyle/>
           <a:p>
             <a:r>
-              <a:rPr lang="en-GB" dirty="0" smtClean="0"/>
-              <a:t>Logline/ Ryan</a:t>
-            </a:r>
-            <a:endParaRPr lang="en-GB" dirty="0"/>
+              <a:rPr lang="en-GB" dirty="0"/>
+              <a:t>Logline/ Introduction Ryan</a:t>
+            </a:r>
           </a:p>
         </p:txBody>
       </p:sp>
@@ -6016,11 +6027,7 @@
             </a:r>
             <a:r>
               <a:rPr lang="en-GB"/>
-              <a:t>save </a:t>
-            </a:r>
-            <a:r>
-              <a:rPr lang="en-GB" smtClean="0"/>
-              <a:t>earth.</a:t>
+              <a:t>save earth.</a:t>
             </a:r>
             <a:endParaRPr lang="en-GB" dirty="0"/>
           </a:p>
@@ -6029,7 +6036,7 @@
     </p:spTree>
     <p:extLst>
       <p:ext uri="{BB962C8B-B14F-4D97-AF65-F5344CB8AC3E}">
-        <p14:creationId xmlns:p14="http://schemas.microsoft.com/office/powerpoint/2010/main" xmlns="" val="1925635564"/>
+        <p14:creationId xmlns:p14="http://schemas.microsoft.com/office/powerpoint/2010/main" val="1925635564"/>
       </p:ext>
     </p:extLst>
   </p:cSld>
@@ -6072,10 +6079,9 @@
           <a:lstStyle/>
           <a:p>
             <a:r>
-              <a:rPr lang="en-GB" dirty="0" smtClean="0"/>
+              <a:rPr lang="en-GB" dirty="0"/>
               <a:t>Target Audience Daniel</a:t>
             </a:r>
-            <a:endParaRPr lang="en-GB" dirty="0"/>
           </a:p>
         </p:txBody>
       </p:sp>
@@ -6100,10 +6106,9 @@
           <a:lstStyle/>
           <a:p>
             <a:r>
-              <a:rPr lang="en-GB" dirty="0" smtClean="0"/>
+              <a:rPr lang="en-GB" dirty="0"/>
               <a:t>Young Adults/Teenagers/Kids</a:t>
             </a:r>
-            <a:endParaRPr lang="en-GB" dirty="0"/>
           </a:p>
         </p:txBody>
       </p:sp>
@@ -6148,69 +6153,98 @@
           <a:lstStyle/>
           <a:p>
             <a:r>
+              <a:rPr lang="en-GB"/>
+              <a:t>Emotions </a:t>
+            </a:r>
+            <a:r>
               <a:rPr lang="en-GB" dirty="0"/>
-              <a:t>Emotions/ </a:t>
-            </a:r>
-            <a:r>
-              <a:rPr lang="en-GB" dirty="0" smtClean="0"/>
-              <a:t>Introduction Alex</a:t>
-            </a:r>
+              <a:t>Alex</a:t>
+            </a:r>
+          </a:p>
+        </p:txBody>
+      </p:sp>
+      <p:sp>
+        <p:nvSpPr>
+          <p:cNvPr id="3" name="Content Placeholder 2"/>
+          <p:cNvSpPr>
+            <a:spLocks noGrp="1"/>
+          </p:cNvSpPr>
+          <p:nvPr>
+            <p:ph idx="1"/>
+          </p:nvPr>
+        </p:nvSpPr>
+        <p:spPr/>
+        <p:txBody>
+          <a:bodyPr/>
+          <a:lstStyle/>
+          <a:p>
+            <a:r>
+              <a:rPr lang="en-GB" b="1" dirty="0" err="1"/>
+              <a:t>Monachopsis</a:t>
+            </a:r>
+            <a:r>
+              <a:rPr lang="en-GB" b="1" dirty="0"/>
+              <a:t>, the subtle but persistent feeling of being out of place</a:t>
+            </a:r>
+          </a:p>
+          <a:p>
+            <a:pPr marL="0" indent="0">
+              <a:buNone/>
+            </a:pPr>
+            <a:r>
+              <a:rPr lang="en-GB" dirty="0"/>
+              <a:t>Achieved by having subtle hints that this bookshop is out of place when player makes progress to the next puzzle</a:t>
+            </a:r>
+          </a:p>
+          <a:p>
+            <a:pPr marL="0" indent="0">
+              <a:buNone/>
+            </a:pPr>
             <a:endParaRPr lang="en-GB" dirty="0"/>
           </a:p>
-        </p:txBody>
-      </p:sp>
-      <p:sp>
-        <p:nvSpPr>
-          <p:cNvPr id="3" name="Content Placeholder 2"/>
-          <p:cNvSpPr>
-            <a:spLocks noGrp="1"/>
-          </p:cNvSpPr>
-          <p:nvPr>
-            <p:ph idx="1"/>
-          </p:nvPr>
-        </p:nvSpPr>
-        <p:spPr/>
-        <p:txBody>
-          <a:bodyPr/>
-          <a:lstStyle/>
-          <a:p>
-            <a:r>
-              <a:rPr lang="en-GB" dirty="0" err="1"/>
-              <a:t>Monachopsis</a:t>
-            </a:r>
+          <a:p>
+            <a:pPr marL="0" indent="0">
+              <a:buNone/>
+            </a:pPr>
             <a:endParaRPr lang="en-GB" dirty="0"/>
           </a:p>
           <a:p>
+            <a:r>
+              <a:rPr lang="en-GB" b="1" dirty="0" err="1"/>
+              <a:t>Vellichor</a:t>
+            </a:r>
+            <a:r>
+              <a:rPr lang="en-GB" b="1" dirty="0"/>
+              <a:t>, the strange wistfulness of used bookshops</a:t>
+            </a:r>
+          </a:p>
+          <a:p>
             <a:pPr marL="0" indent="0">
               <a:buNone/>
             </a:pPr>
             <a:r>
               <a:rPr lang="en-GB" dirty="0"/>
-              <a:t>Achieved by having subtle hints that this bookshop is out of place</a:t>
-            </a:r>
-          </a:p>
-          <a:p>
-            <a:r>
-              <a:rPr lang="en-GB" dirty="0" err="1"/>
-              <a:t>Vellichor</a:t>
-            </a:r>
+              <a:t>Achieved by showing vintage décor and artwork of bookshop. The bookshop backgrounds will change as player progresses through puzzles.</a:t>
+            </a:r>
+          </a:p>
+          <a:p>
+            <a:pPr marL="0" indent="0">
+              <a:buNone/>
+            </a:pPr>
             <a:endParaRPr lang="en-GB" dirty="0"/>
           </a:p>
           <a:p>
             <a:pPr marL="0" indent="0">
               <a:buNone/>
             </a:pPr>
-            <a:r>
-              <a:rPr lang="en-GB" dirty="0"/>
-              <a:t>Achieved by showing vintage décor and artwork of bookshop</a:t>
-            </a:r>
+            <a:endParaRPr lang="en-GB" dirty="0"/>
           </a:p>
         </p:txBody>
       </p:sp>
     </p:spTree>
     <p:extLst>
       <p:ext uri="{BB962C8B-B14F-4D97-AF65-F5344CB8AC3E}">
-        <p14:creationId xmlns:p14="http://schemas.microsoft.com/office/powerpoint/2010/main" xmlns="" val="2525450431"/>
+        <p14:creationId xmlns:p14="http://schemas.microsoft.com/office/powerpoint/2010/main" val="2525450431"/>
       </p:ext>
     </p:extLst>
   </p:cSld>
@@ -6254,13 +6288,8 @@
           <a:p>
             <a:r>
               <a:rPr lang="en-GB" dirty="0"/>
-              <a:t>What does the player do</a:t>
-            </a:r>
-            <a:r>
-              <a:rPr lang="en-GB" dirty="0" smtClean="0"/>
-              <a:t>?/ Mechanics Ryan</a:t>
-            </a:r>
-            <a:endParaRPr lang="en-GB" dirty="0"/>
+              <a:t>What does the player do?/ Mechanics Ryan</a:t>
+            </a:r>
           </a:p>
         </p:txBody>
       </p:sp>
@@ -6304,7 +6333,7 @@
     </p:spTree>
     <p:extLst>
       <p:ext uri="{BB962C8B-B14F-4D97-AF65-F5344CB8AC3E}">
-        <p14:creationId xmlns:p14="http://schemas.microsoft.com/office/powerpoint/2010/main" xmlns="" val="3361430429"/>
+        <p14:creationId xmlns:p14="http://schemas.microsoft.com/office/powerpoint/2010/main" val="3361430429"/>
       </p:ext>
     </p:extLst>
   </p:cSld>
@@ -6347,10 +6376,9 @@
           <a:lstStyle/>
           <a:p>
             <a:r>
-              <a:rPr lang="en-GB" dirty="0" smtClean="0"/>
+              <a:rPr lang="en-GB" dirty="0"/>
               <a:t>Moodboards Tom</a:t>
             </a:r>
-            <a:endParaRPr lang="en-GB" dirty="0"/>
           </a:p>
         </p:txBody>
       </p:sp>
@@ -6376,7 +6404,7 @@
     </p:spTree>
     <p:extLst>
       <p:ext uri="{BB962C8B-B14F-4D97-AF65-F5344CB8AC3E}">
-        <p14:creationId xmlns:p14="http://schemas.microsoft.com/office/powerpoint/2010/main" xmlns="" val="2445174280"/>
+        <p14:creationId xmlns:p14="http://schemas.microsoft.com/office/powerpoint/2010/main" val="2445174280"/>
       </p:ext>
     </p:extLst>
   </p:cSld>
@@ -6420,13 +6448,8 @@
           <a:p>
             <a:r>
               <a:rPr lang="en-GB" dirty="0"/>
-              <a:t>Art </a:t>
-            </a:r>
-            <a:r>
-              <a:rPr lang="en-GB" dirty="0" smtClean="0"/>
-              <a:t>Style Tom</a:t>
-            </a:r>
-            <a:endParaRPr lang="en-GB" dirty="0"/>
+              <a:t>Art Style Tom</a:t>
+            </a:r>
           </a:p>
         </p:txBody>
       </p:sp>
@@ -6464,7 +6487,173 @@
     </p:spTree>
     <p:extLst>
       <p:ext uri="{BB962C8B-B14F-4D97-AF65-F5344CB8AC3E}">
-        <p14:creationId xmlns:p14="http://schemas.microsoft.com/office/powerpoint/2010/main" xmlns="" val="2005683756"/>
+        <p14:creationId xmlns:p14="http://schemas.microsoft.com/office/powerpoint/2010/main" val="2005683756"/>
+      </p:ext>
+    </p:extLst>
+  </p:cSld>
+  <p:clrMapOvr>
+    <a:masterClrMapping/>
+  </p:clrMapOvr>
+</p:sld>
+</file>
+
+<file path=ppt/slides/slide8.xml><?xml version="1.0" encoding="utf-8"?>
+<p:sld xmlns:a="http://schemas.openxmlformats.org/drawingml/2006/main" xmlns:r="http://schemas.openxmlformats.org/officeDocument/2006/relationships" xmlns:p="http://schemas.openxmlformats.org/presentationml/2006/main">
+  <p:cSld>
+    <p:spTree>
+      <p:nvGrpSpPr>
+        <p:cNvPr id="1" name=""/>
+        <p:cNvGrpSpPr/>
+        <p:nvPr/>
+      </p:nvGrpSpPr>
+      <p:grpSpPr>
+        <a:xfrm>
+          <a:off x="0" y="0"/>
+          <a:ext cx="0" cy="0"/>
+          <a:chOff x="0" y="0"/>
+          <a:chExt cx="0" cy="0"/>
+        </a:xfrm>
+      </p:grpSpPr>
+      <p:sp>
+        <p:nvSpPr>
+          <p:cNvPr id="2" name="Title 1"/>
+          <p:cNvSpPr>
+            <a:spLocks noGrp="1"/>
+          </p:cNvSpPr>
+          <p:nvPr>
+            <p:ph type="title"/>
+          </p:nvPr>
+        </p:nvSpPr>
+        <p:spPr/>
+        <p:txBody>
+          <a:bodyPr/>
+          <a:lstStyle/>
+          <a:p>
+            <a:r>
+              <a:rPr lang="en-GB" dirty="0"/>
+              <a:t>Project management</a:t>
+            </a:r>
+          </a:p>
+        </p:txBody>
+      </p:sp>
+      <p:sp>
+        <p:nvSpPr>
+          <p:cNvPr id="3" name="Content Placeholder 2"/>
+          <p:cNvSpPr>
+            <a:spLocks noGrp="1"/>
+          </p:cNvSpPr>
+          <p:nvPr>
+            <p:ph idx="1"/>
+          </p:nvPr>
+        </p:nvSpPr>
+        <p:spPr>
+          <a:xfrm>
+            <a:off x="677334" y="1258349"/>
+            <a:ext cx="8596668" cy="5276675"/>
+          </a:xfrm>
+        </p:spPr>
+        <p:txBody>
+          <a:bodyPr/>
+          <a:lstStyle/>
+          <a:p>
+            <a:r>
+              <a:rPr lang="en-GB" dirty="0"/>
+              <a:t>Emails sent</a:t>
+            </a:r>
+          </a:p>
+          <a:p>
+            <a:pPr marL="0" indent="0">
+              <a:buNone/>
+            </a:pPr>
+            <a:r>
+              <a:rPr lang="en-GB" dirty="0"/>
+              <a:t>Alex: 7</a:t>
+            </a:r>
+          </a:p>
+          <a:p>
+            <a:pPr marL="0" indent="0">
+              <a:buNone/>
+            </a:pPr>
+            <a:r>
+              <a:rPr lang="en-GB" dirty="0"/>
+              <a:t>Ryan: 5</a:t>
+            </a:r>
+          </a:p>
+          <a:p>
+            <a:pPr marL="0" indent="0">
+              <a:buNone/>
+            </a:pPr>
+            <a:r>
+              <a:rPr lang="en-GB" dirty="0"/>
+              <a:t>Daniel: 2 </a:t>
+            </a:r>
+          </a:p>
+          <a:p>
+            <a:pPr marL="0" indent="0">
+              <a:buNone/>
+            </a:pPr>
+            <a:r>
+              <a:rPr lang="en-GB" dirty="0"/>
+              <a:t>Tom: 1</a:t>
+            </a:r>
+          </a:p>
+          <a:p>
+            <a:pPr marL="0" indent="0">
+              <a:buNone/>
+            </a:pPr>
+            <a:r>
+              <a:rPr lang="en-GB" dirty="0"/>
+              <a:t>Overall: 15</a:t>
+            </a:r>
+          </a:p>
+          <a:p>
+            <a:pPr marL="0" indent="0">
+              <a:buNone/>
+            </a:pPr>
+            <a:endParaRPr lang="en-GB" dirty="0"/>
+          </a:p>
+          <a:p>
+            <a:r>
+              <a:rPr lang="en-GB" dirty="0"/>
+              <a:t>Meetings</a:t>
+            </a:r>
+          </a:p>
+          <a:p>
+            <a:pPr marL="0" indent="0">
+              <a:buNone/>
+            </a:pPr>
+            <a:r>
+              <a:rPr lang="en-GB" dirty="0"/>
+              <a:t>1 informal meeting, 30 mins</a:t>
+            </a:r>
+          </a:p>
+          <a:p>
+            <a:pPr marL="0" indent="0">
+              <a:buNone/>
+            </a:pPr>
+            <a:endParaRPr lang="en-GB" dirty="0"/>
+          </a:p>
+          <a:p>
+            <a:r>
+              <a:rPr lang="en-GB" dirty="0"/>
+              <a:t>Hours logged</a:t>
+            </a:r>
+          </a:p>
+          <a:p>
+            <a:pPr marL="0" indent="0">
+              <a:buNone/>
+            </a:pPr>
+            <a:r>
+              <a:rPr lang="en-GB" dirty="0"/>
+              <a:t>No hours logged yet, first sprint to be set today</a:t>
+            </a:r>
+          </a:p>
+        </p:txBody>
+      </p:sp>
+    </p:spTree>
+    <p:extLst>
+      <p:ext uri="{BB962C8B-B14F-4D97-AF65-F5344CB8AC3E}">
+        <p14:creationId xmlns:p14="http://schemas.microsoft.com/office/powerpoint/2010/main" val="2670981841"/>
       </p:ext>
     </p:extLst>
   </p:cSld>
@@ -6725,7 +6914,7 @@
   <a:extraClrSchemeLst/>
   <a:extLst>
     <a:ext uri="{05A4C25C-085E-4340-85A3-A5531E510DB2}">
-      <thm15:themeFamily xmlns:thm15="http://schemas.microsoft.com/office/thememl/2012/main" xmlns="" name="Facet" id="{C0C680CD-088A-49FC-A102-D699147F32B2}" vid="{CFBC31BA-B70F-4F30-BCAA-4F3011E16C4D}"/>
+      <thm15:themeFamily xmlns:thm15="http://schemas.microsoft.com/office/thememl/2012/main" name="Facet" id="{C0C680CD-088A-49FC-A102-D699147F32B2}" vid="{CFBC31BA-B70F-4F30-BCAA-4F3011E16C4D}"/>
     </a:ext>
   </a:extLst>
 </a:theme>

</xml_diff>

<commit_message>
Updated Target Audience slide.
I have updated the slide I will be presenting, and added some notes to
the slide too.
</commit_message>
<xml_diff>
--- a/Group 14.pptx
+++ b/Group 14.pptx
@@ -4,6 +4,9 @@
   <p:sldMasterIdLst>
     <p:sldMasterId id="2147483677" r:id="rId1"/>
   </p:sldMasterIdLst>
+  <p:notesMasterIdLst>
+    <p:notesMasterId r:id="rId10"/>
+  </p:notesMasterIdLst>
   <p:sldIdLst>
     <p:sldId id="256" r:id="rId2"/>
     <p:sldId id="257" r:id="rId3"/>
@@ -128,6 +131,523 @@
     </p:ext>
   </p:extLst>
 </p:presentation>
+</file>
+
+<file path=ppt/notesMasters/notesMaster1.xml><?xml version="1.0" encoding="utf-8"?>
+<p:notesMaster xmlns:a="http://schemas.openxmlformats.org/drawingml/2006/main" xmlns:r="http://schemas.openxmlformats.org/officeDocument/2006/relationships" xmlns:p="http://schemas.openxmlformats.org/presentationml/2006/main">
+  <p:cSld>
+    <p:bg>
+      <p:bgRef idx="1001">
+        <a:schemeClr val="bg1"/>
+      </p:bgRef>
+    </p:bg>
+    <p:spTree>
+      <p:nvGrpSpPr>
+        <p:cNvPr id="1" name=""/>
+        <p:cNvGrpSpPr/>
+        <p:nvPr/>
+      </p:nvGrpSpPr>
+      <p:grpSpPr>
+        <a:xfrm>
+          <a:off x="0" y="0"/>
+          <a:ext cx="0" cy="0"/>
+          <a:chOff x="0" y="0"/>
+          <a:chExt cx="0" cy="0"/>
+        </a:xfrm>
+      </p:grpSpPr>
+      <p:sp>
+        <p:nvSpPr>
+          <p:cNvPr id="2" name="Header Placeholder 1"/>
+          <p:cNvSpPr>
+            <a:spLocks noGrp="1"/>
+          </p:cNvSpPr>
+          <p:nvPr>
+            <p:ph type="hdr" sz="quarter"/>
+          </p:nvPr>
+        </p:nvSpPr>
+        <p:spPr>
+          <a:xfrm>
+            <a:off x="0" y="0"/>
+            <a:ext cx="2971800" cy="458788"/>
+          </a:xfrm>
+          <a:prstGeom prst="rect">
+            <a:avLst/>
+          </a:prstGeom>
+        </p:spPr>
+        <p:txBody>
+          <a:bodyPr vert="horz" lIns="91440" tIns="45720" rIns="91440" bIns="45720" rtlCol="0"/>
+          <a:lstStyle>
+            <a:lvl1pPr algn="l">
+              <a:defRPr sz="1200"/>
+            </a:lvl1pPr>
+          </a:lstStyle>
+          <a:p>
+            <a:endParaRPr lang="en-US"/>
+          </a:p>
+        </p:txBody>
+      </p:sp>
+      <p:sp>
+        <p:nvSpPr>
+          <p:cNvPr id="3" name="Date Placeholder 2"/>
+          <p:cNvSpPr>
+            <a:spLocks noGrp="1"/>
+          </p:cNvSpPr>
+          <p:nvPr>
+            <p:ph type="dt" idx="1"/>
+          </p:nvPr>
+        </p:nvSpPr>
+        <p:spPr>
+          <a:xfrm>
+            <a:off x="3884613" y="0"/>
+            <a:ext cx="2971800" cy="458788"/>
+          </a:xfrm>
+          <a:prstGeom prst="rect">
+            <a:avLst/>
+          </a:prstGeom>
+        </p:spPr>
+        <p:txBody>
+          <a:bodyPr vert="horz" lIns="91440" tIns="45720" rIns="91440" bIns="45720" rtlCol="0"/>
+          <a:lstStyle>
+            <a:lvl1pPr algn="r">
+              <a:defRPr sz="1200"/>
+            </a:lvl1pPr>
+          </a:lstStyle>
+          <a:p>
+            <a:fld id="{0E979622-FC95-4062-B0FB-BFF025AB3596}" type="datetimeFigureOut">
+              <a:rPr lang="en-US" smtClean="0"/>
+              <a:t>18-Oct-16</a:t>
+            </a:fld>
+            <a:endParaRPr lang="en-US"/>
+          </a:p>
+        </p:txBody>
+      </p:sp>
+      <p:sp>
+        <p:nvSpPr>
+          <p:cNvPr id="4" name="Slide Image Placeholder 3"/>
+          <p:cNvSpPr>
+            <a:spLocks noGrp="1" noRot="1" noChangeAspect="1"/>
+          </p:cNvSpPr>
+          <p:nvPr>
+            <p:ph type="sldImg" idx="2"/>
+          </p:nvPr>
+        </p:nvSpPr>
+        <p:spPr>
+          <a:xfrm>
+            <a:off x="685800" y="1143000"/>
+            <a:ext cx="5486400" cy="3086100"/>
+          </a:xfrm>
+          <a:prstGeom prst="rect">
+            <a:avLst/>
+          </a:prstGeom>
+          <a:noFill/>
+          <a:ln w="12700">
+            <a:solidFill>
+              <a:prstClr val="black"/>
+            </a:solidFill>
+          </a:ln>
+        </p:spPr>
+        <p:txBody>
+          <a:bodyPr vert="horz" lIns="91440" tIns="45720" rIns="91440" bIns="45720" rtlCol="0" anchor="ctr"/>
+          <a:lstStyle/>
+          <a:p>
+            <a:endParaRPr lang="en-US"/>
+          </a:p>
+        </p:txBody>
+      </p:sp>
+      <p:sp>
+        <p:nvSpPr>
+          <p:cNvPr id="5" name="Notes Placeholder 4"/>
+          <p:cNvSpPr>
+            <a:spLocks noGrp="1"/>
+          </p:cNvSpPr>
+          <p:nvPr>
+            <p:ph type="body" sz="quarter" idx="3"/>
+          </p:nvPr>
+        </p:nvSpPr>
+        <p:spPr>
+          <a:xfrm>
+            <a:off x="685800" y="4400550"/>
+            <a:ext cx="5486400" cy="3600450"/>
+          </a:xfrm>
+          <a:prstGeom prst="rect">
+            <a:avLst/>
+          </a:prstGeom>
+        </p:spPr>
+        <p:txBody>
+          <a:bodyPr vert="horz" lIns="91440" tIns="45720" rIns="91440" bIns="45720" rtlCol="0"/>
+          <a:lstStyle/>
+          <a:p>
+            <a:pPr lvl="0"/>
+            <a:r>
+              <a:rPr lang="en-US"/>
+              <a:t>Edit Master text styles</a:t>
+            </a:r>
+          </a:p>
+          <a:p>
+            <a:pPr lvl="1"/>
+            <a:r>
+              <a:rPr lang="en-US"/>
+              <a:t>Second level</a:t>
+            </a:r>
+          </a:p>
+          <a:p>
+            <a:pPr lvl="2"/>
+            <a:r>
+              <a:rPr lang="en-US"/>
+              <a:t>Third level</a:t>
+            </a:r>
+          </a:p>
+          <a:p>
+            <a:pPr lvl="3"/>
+            <a:r>
+              <a:rPr lang="en-US"/>
+              <a:t>Fourth level</a:t>
+            </a:r>
+          </a:p>
+          <a:p>
+            <a:pPr lvl="4"/>
+            <a:r>
+              <a:rPr lang="en-US"/>
+              <a:t>Fifth level</a:t>
+            </a:r>
+            <a:endParaRPr lang="en-US"/>
+          </a:p>
+        </p:txBody>
+      </p:sp>
+      <p:sp>
+        <p:nvSpPr>
+          <p:cNvPr id="6" name="Footer Placeholder 5"/>
+          <p:cNvSpPr>
+            <a:spLocks noGrp="1"/>
+          </p:cNvSpPr>
+          <p:nvPr>
+            <p:ph type="ftr" sz="quarter" idx="4"/>
+          </p:nvPr>
+        </p:nvSpPr>
+        <p:spPr>
+          <a:xfrm>
+            <a:off x="0" y="8685213"/>
+            <a:ext cx="2971800" cy="458787"/>
+          </a:xfrm>
+          <a:prstGeom prst="rect">
+            <a:avLst/>
+          </a:prstGeom>
+        </p:spPr>
+        <p:txBody>
+          <a:bodyPr vert="horz" lIns="91440" tIns="45720" rIns="91440" bIns="45720" rtlCol="0" anchor="b"/>
+          <a:lstStyle>
+            <a:lvl1pPr algn="l">
+              <a:defRPr sz="1200"/>
+            </a:lvl1pPr>
+          </a:lstStyle>
+          <a:p>
+            <a:endParaRPr lang="en-US"/>
+          </a:p>
+        </p:txBody>
+      </p:sp>
+      <p:sp>
+        <p:nvSpPr>
+          <p:cNvPr id="7" name="Slide Number Placeholder 6"/>
+          <p:cNvSpPr>
+            <a:spLocks noGrp="1"/>
+          </p:cNvSpPr>
+          <p:nvPr>
+            <p:ph type="sldNum" sz="quarter" idx="5"/>
+          </p:nvPr>
+        </p:nvSpPr>
+        <p:spPr>
+          <a:xfrm>
+            <a:off x="3884613" y="8685213"/>
+            <a:ext cx="2971800" cy="458787"/>
+          </a:xfrm>
+          <a:prstGeom prst="rect">
+            <a:avLst/>
+          </a:prstGeom>
+        </p:spPr>
+        <p:txBody>
+          <a:bodyPr vert="horz" lIns="91440" tIns="45720" rIns="91440" bIns="45720" rtlCol="0" anchor="b"/>
+          <a:lstStyle>
+            <a:lvl1pPr algn="r">
+              <a:defRPr sz="1200"/>
+            </a:lvl1pPr>
+          </a:lstStyle>
+          <a:p>
+            <a:fld id="{4A8F653E-C00D-47FE-A241-1FE52C2B9307}" type="slidenum">
+              <a:rPr lang="en-US" smtClean="0"/>
+              <a:t>‹#›</a:t>
+            </a:fld>
+            <a:endParaRPr lang="en-US"/>
+          </a:p>
+        </p:txBody>
+      </p:sp>
+    </p:spTree>
+    <p:extLst>
+      <p:ext uri="{BB962C8B-B14F-4D97-AF65-F5344CB8AC3E}">
+        <p14:creationId xmlns:p14="http://schemas.microsoft.com/office/powerpoint/2010/main" val="1094693689"/>
+      </p:ext>
+    </p:extLst>
+  </p:cSld>
+  <p:clrMap bg1="lt1" tx1="dk1" bg2="lt2" tx2="dk2" accent1="accent1" accent2="accent2" accent3="accent3" accent4="accent4" accent5="accent5" accent6="accent6" hlink="hlink" folHlink="folHlink"/>
+  <p:notesStyle>
+    <a:lvl1pPr marL="0" algn="l" defTabSz="914400" rtl="0" eaLnBrk="1" latinLnBrk="0" hangingPunct="1">
+      <a:defRPr sz="1200" kern="1200">
+        <a:solidFill>
+          <a:schemeClr val="tx1"/>
+        </a:solidFill>
+        <a:latin typeface="+mn-lt"/>
+        <a:ea typeface="+mn-ea"/>
+        <a:cs typeface="+mn-cs"/>
+      </a:defRPr>
+    </a:lvl1pPr>
+    <a:lvl2pPr marL="457200" algn="l" defTabSz="914400" rtl="0" eaLnBrk="1" latinLnBrk="0" hangingPunct="1">
+      <a:defRPr sz="1200" kern="1200">
+        <a:solidFill>
+          <a:schemeClr val="tx1"/>
+        </a:solidFill>
+        <a:latin typeface="+mn-lt"/>
+        <a:ea typeface="+mn-ea"/>
+        <a:cs typeface="+mn-cs"/>
+      </a:defRPr>
+    </a:lvl2pPr>
+    <a:lvl3pPr marL="914400" algn="l" defTabSz="914400" rtl="0" eaLnBrk="1" latinLnBrk="0" hangingPunct="1">
+      <a:defRPr sz="1200" kern="1200">
+        <a:solidFill>
+          <a:schemeClr val="tx1"/>
+        </a:solidFill>
+        <a:latin typeface="+mn-lt"/>
+        <a:ea typeface="+mn-ea"/>
+        <a:cs typeface="+mn-cs"/>
+      </a:defRPr>
+    </a:lvl3pPr>
+    <a:lvl4pPr marL="1371600" algn="l" defTabSz="914400" rtl="0" eaLnBrk="1" latinLnBrk="0" hangingPunct="1">
+      <a:defRPr sz="1200" kern="1200">
+        <a:solidFill>
+          <a:schemeClr val="tx1"/>
+        </a:solidFill>
+        <a:latin typeface="+mn-lt"/>
+        <a:ea typeface="+mn-ea"/>
+        <a:cs typeface="+mn-cs"/>
+      </a:defRPr>
+    </a:lvl4pPr>
+    <a:lvl5pPr marL="1828800" algn="l" defTabSz="914400" rtl="0" eaLnBrk="1" latinLnBrk="0" hangingPunct="1">
+      <a:defRPr sz="1200" kern="1200">
+        <a:solidFill>
+          <a:schemeClr val="tx1"/>
+        </a:solidFill>
+        <a:latin typeface="+mn-lt"/>
+        <a:ea typeface="+mn-ea"/>
+        <a:cs typeface="+mn-cs"/>
+      </a:defRPr>
+    </a:lvl5pPr>
+    <a:lvl6pPr marL="2286000" algn="l" defTabSz="914400" rtl="0" eaLnBrk="1" latinLnBrk="0" hangingPunct="1">
+      <a:defRPr sz="1200" kern="1200">
+        <a:solidFill>
+          <a:schemeClr val="tx1"/>
+        </a:solidFill>
+        <a:latin typeface="+mn-lt"/>
+        <a:ea typeface="+mn-ea"/>
+        <a:cs typeface="+mn-cs"/>
+      </a:defRPr>
+    </a:lvl6pPr>
+    <a:lvl7pPr marL="2743200" algn="l" defTabSz="914400" rtl="0" eaLnBrk="1" latinLnBrk="0" hangingPunct="1">
+      <a:defRPr sz="1200" kern="1200">
+        <a:solidFill>
+          <a:schemeClr val="tx1"/>
+        </a:solidFill>
+        <a:latin typeface="+mn-lt"/>
+        <a:ea typeface="+mn-ea"/>
+        <a:cs typeface="+mn-cs"/>
+      </a:defRPr>
+    </a:lvl7pPr>
+    <a:lvl8pPr marL="3200400" algn="l" defTabSz="914400" rtl="0" eaLnBrk="1" latinLnBrk="0" hangingPunct="1">
+      <a:defRPr sz="1200" kern="1200">
+        <a:solidFill>
+          <a:schemeClr val="tx1"/>
+        </a:solidFill>
+        <a:latin typeface="+mn-lt"/>
+        <a:ea typeface="+mn-ea"/>
+        <a:cs typeface="+mn-cs"/>
+      </a:defRPr>
+    </a:lvl8pPr>
+    <a:lvl9pPr marL="3657600" algn="l" defTabSz="914400" rtl="0" eaLnBrk="1" latinLnBrk="0" hangingPunct="1">
+      <a:defRPr sz="1200" kern="1200">
+        <a:solidFill>
+          <a:schemeClr val="tx1"/>
+        </a:solidFill>
+        <a:latin typeface="+mn-lt"/>
+        <a:ea typeface="+mn-ea"/>
+        <a:cs typeface="+mn-cs"/>
+      </a:defRPr>
+    </a:lvl9pPr>
+  </p:notesStyle>
+</p:notesMaster>
+</file>
+
+<file path=ppt/notesSlides/notesSlide1.xml><?xml version="1.0" encoding="utf-8"?>
+<p:notes xmlns:a="http://schemas.openxmlformats.org/drawingml/2006/main" xmlns:r="http://schemas.openxmlformats.org/officeDocument/2006/relationships" xmlns:p="http://schemas.openxmlformats.org/presentationml/2006/main">
+  <p:cSld>
+    <p:spTree>
+      <p:nvGrpSpPr>
+        <p:cNvPr id="1" name=""/>
+        <p:cNvGrpSpPr/>
+        <p:nvPr/>
+      </p:nvGrpSpPr>
+      <p:grpSpPr>
+        <a:xfrm>
+          <a:off x="0" y="0"/>
+          <a:ext cx="0" cy="0"/>
+          <a:chOff x="0" y="0"/>
+          <a:chExt cx="0" cy="0"/>
+        </a:xfrm>
+      </p:grpSpPr>
+      <p:sp>
+        <p:nvSpPr>
+          <p:cNvPr id="2" name="Slide Image Placeholder 1"/>
+          <p:cNvSpPr>
+            <a:spLocks noGrp="1" noRot="1" noChangeAspect="1"/>
+          </p:cNvSpPr>
+          <p:nvPr>
+            <p:ph type="sldImg"/>
+          </p:nvPr>
+        </p:nvSpPr>
+        <p:spPr/>
+      </p:sp>
+      <p:sp>
+        <p:nvSpPr>
+          <p:cNvPr id="3" name="Notes Placeholder 2"/>
+          <p:cNvSpPr>
+            <a:spLocks noGrp="1"/>
+          </p:cNvSpPr>
+          <p:nvPr>
+            <p:ph type="body" idx="1"/>
+          </p:nvPr>
+        </p:nvSpPr>
+        <p:spPr/>
+        <p:txBody>
+          <a:bodyPr/>
+          <a:lstStyle/>
+          <a:p>
+            <a:r>
+              <a:rPr lang="en-US" dirty="0"/>
+              <a:t>Teenagers</a:t>
+            </a:r>
+            <a:r>
+              <a:rPr lang="en-US" baseline="0" dirty="0"/>
+              <a:t> and Kids:</a:t>
+            </a:r>
+          </a:p>
+          <a:p>
+            <a:pPr marL="171450" indent="-171450">
+              <a:buFontTx/>
+              <a:buChar char="-"/>
+            </a:pPr>
+            <a:r>
+              <a:rPr lang="en-US" baseline="0" dirty="0"/>
+              <a:t>historical theme of sorting books and learning history ++</a:t>
+            </a:r>
+          </a:p>
+          <a:p>
+            <a:pPr marL="171450" indent="-171450">
+              <a:buFontTx/>
+              <a:buChar char="-"/>
+            </a:pPr>
+            <a:r>
+              <a:rPr lang="en-US" baseline="0" dirty="0"/>
+              <a:t>Educational theme can be appealing to students and kids</a:t>
+            </a:r>
+          </a:p>
+          <a:p>
+            <a:pPr marL="171450" indent="-171450">
+              <a:buFontTx/>
+              <a:buChar char="-"/>
+            </a:pPr>
+            <a:endParaRPr lang="en-US" baseline="0" dirty="0"/>
+          </a:p>
+          <a:p>
+            <a:pPr marL="0" indent="0">
+              <a:buFontTx/>
+              <a:buNone/>
+            </a:pPr>
+            <a:r>
+              <a:rPr lang="en-US" baseline="0" dirty="0"/>
+              <a:t>Young Adults &amp; Teenagers:</a:t>
+            </a:r>
+          </a:p>
+          <a:p>
+            <a:pPr marL="171450" indent="-171450">
+              <a:buFontTx/>
+              <a:buChar char="-"/>
+            </a:pPr>
+            <a:r>
+              <a:rPr lang="en-US" baseline="0" dirty="0"/>
+              <a:t>Majority of mobile players ++</a:t>
+            </a:r>
+          </a:p>
+          <a:p>
+            <a:pPr marL="171450" indent="-171450">
+              <a:buFontTx/>
+              <a:buChar char="-"/>
+            </a:pPr>
+            <a:r>
+              <a:rPr lang="en-US" baseline="0" dirty="0"/>
+              <a:t>They will find the theme of history interesting</a:t>
+            </a:r>
+          </a:p>
+          <a:p>
+            <a:pPr marL="171450" indent="-171450">
+              <a:buFontTx/>
+              <a:buChar char="-"/>
+            </a:pPr>
+            <a:r>
+              <a:rPr lang="en-US" dirty="0"/>
+              <a:t>Puzzle games go well</a:t>
+            </a:r>
+            <a:r>
+              <a:rPr lang="en-US" baseline="0" dirty="0"/>
+              <a:t> with mobile games, as they are easy to play on </a:t>
+            </a:r>
+            <a:r>
+              <a:rPr lang="en-US" baseline="0"/>
+              <a:t>mobile platforms</a:t>
+            </a:r>
+            <a:endParaRPr lang="en-US" dirty="0"/>
+          </a:p>
+        </p:txBody>
+      </p:sp>
+      <p:sp>
+        <p:nvSpPr>
+          <p:cNvPr id="4" name="Slide Number Placeholder 3"/>
+          <p:cNvSpPr>
+            <a:spLocks noGrp="1"/>
+          </p:cNvSpPr>
+          <p:nvPr>
+            <p:ph type="sldNum" sz="quarter" idx="10"/>
+          </p:nvPr>
+        </p:nvSpPr>
+        <p:spPr/>
+        <p:txBody>
+          <a:bodyPr/>
+          <a:lstStyle/>
+          <a:p>
+            <a:fld id="{4A8F653E-C00D-47FE-A241-1FE52C2B9307}" type="slidenum">
+              <a:rPr lang="en-US" smtClean="0"/>
+              <a:t>3</a:t>
+            </a:fld>
+            <a:endParaRPr lang="en-US"/>
+          </a:p>
+        </p:txBody>
+      </p:sp>
+    </p:spTree>
+    <p:extLst>
+      <p:ext uri="{BB962C8B-B14F-4D97-AF65-F5344CB8AC3E}">
+        <p14:creationId xmlns:p14="http://schemas.microsoft.com/office/powerpoint/2010/main" val="1389064531"/>
+      </p:ext>
+    </p:extLst>
+  </p:cSld>
+  <p:clrMapOvr>
+    <a:masterClrMapping/>
+  </p:clrMapOvr>
+</p:notes>
 </file>
 
 <file path=ppt/slideLayouts/slideLayout1.xml><?xml version="1.0" encoding="utf-8"?>
@@ -6106,8 +6626,35 @@
           <a:lstStyle/>
           <a:p>
             <a:r>
+              <a:rPr lang="en-GB" b="1" dirty="0"/>
+              <a:t>Teenagers &amp; Kids will find the historical theme interesting.</a:t>
+            </a:r>
+          </a:p>
+          <a:p>
+            <a:pPr marL="0" indent="0">
+              <a:buNone/>
+            </a:pPr>
+            <a:r>
               <a:rPr lang="en-GB" dirty="0"/>
-              <a:t>Young Adults/Teenagers/Kids</a:t>
+              <a:t>Young Adults and Teenagers will be interested in the historical and educational theme of sorting books chronologically.</a:t>
+            </a:r>
+          </a:p>
+          <a:p>
+            <a:endParaRPr lang="en-GB" dirty="0"/>
+          </a:p>
+          <a:p>
+            <a:r>
+              <a:rPr lang="en-GB" b="1" dirty="0"/>
+              <a:t>Young Adults &amp; Teenagers will like the puzzle genre of the game.</a:t>
+            </a:r>
+          </a:p>
+          <a:p>
+            <a:pPr marL="0" indent="0">
+              <a:buNone/>
+            </a:pPr>
+            <a:r>
+              <a:rPr lang="en-GB" dirty="0"/>
+              <a:t>Teenagers and Young Adults are the majority of mobile players. Puzzle games go well with mobile games.</a:t>
             </a:r>
           </a:p>
         </p:txBody>
@@ -6918,4 +7465,299 @@
     </a:ext>
   </a:extLst>
 </a:theme>
+</file>
+
+<file path=ppt/theme/theme2.xml><?xml version="1.0" encoding="utf-8"?>
+<a:theme xmlns:a="http://schemas.openxmlformats.org/drawingml/2006/main" name="Office Theme">
+  <a:themeElements>
+    <a:clrScheme name="Office">
+      <a:dk1>
+        <a:sysClr val="windowText" lastClr="000000"/>
+      </a:dk1>
+      <a:lt1>
+        <a:sysClr val="window" lastClr="FFFFFF"/>
+      </a:lt1>
+      <a:dk2>
+        <a:srgbClr val="44546A"/>
+      </a:dk2>
+      <a:lt2>
+        <a:srgbClr val="E7E6E6"/>
+      </a:lt2>
+      <a:accent1>
+        <a:srgbClr val="5B9BD5"/>
+      </a:accent1>
+      <a:accent2>
+        <a:srgbClr val="ED7D31"/>
+      </a:accent2>
+      <a:accent3>
+        <a:srgbClr val="A5A5A5"/>
+      </a:accent3>
+      <a:accent4>
+        <a:srgbClr val="FFC000"/>
+      </a:accent4>
+      <a:accent5>
+        <a:srgbClr val="4472C4"/>
+      </a:accent5>
+      <a:accent6>
+        <a:srgbClr val="70AD47"/>
+      </a:accent6>
+      <a:hlink>
+        <a:srgbClr val="0563C1"/>
+      </a:hlink>
+      <a:folHlink>
+        <a:srgbClr val="954F72"/>
+      </a:folHlink>
+    </a:clrScheme>
+    <a:fontScheme name="Office">
+      <a:majorFont>
+        <a:latin typeface="Calibri Light" panose="020F0302020204030204"/>
+        <a:ea typeface=""/>
+        <a:cs typeface=""/>
+        <a:font script="Jpan" typeface="游ゴシック Light"/>
+        <a:font script="Hang" typeface="맑은 고딕"/>
+        <a:font script="Hans" typeface="等线 Light"/>
+        <a:font script="Hant" typeface="新細明體"/>
+        <a:font script="Arab" typeface="Times New Roman"/>
+        <a:font script="Hebr" typeface="Times New Roman"/>
+        <a:font script="Thai" typeface="Angsana New"/>
+        <a:font script="Ethi" typeface="Nyala"/>
+        <a:font script="Beng" typeface="Vrinda"/>
+        <a:font script="Gujr" typeface="Shruti"/>
+        <a:font script="Khmr" typeface="MoolBoran"/>
+        <a:font script="Knda" typeface="Tunga"/>
+        <a:font script="Guru" typeface="Raavi"/>
+        <a:font script="Cans" typeface="Euphemia"/>
+        <a:font script="Cher" typeface="Plantagenet Cherokee"/>
+        <a:font script="Yiii" typeface="Microsoft Yi Baiti"/>
+        <a:font script="Tibt" typeface="Microsoft Himalaya"/>
+        <a:font script="Thaa" typeface="MV Boli"/>
+        <a:font script="Deva" typeface="Mangal"/>
+        <a:font script="Telu" typeface="Gautami"/>
+        <a:font script="Taml" typeface="Latha"/>
+        <a:font script="Syrc" typeface="Estrangelo Edessa"/>
+        <a:font script="Orya" typeface="Kalinga"/>
+        <a:font script="Mlym" typeface="Kartika"/>
+        <a:font script="Laoo" typeface="DokChampa"/>
+        <a:font script="Sinh" typeface="Iskoola Pota"/>
+        <a:font script="Mong" typeface="Mongolian Baiti"/>
+        <a:font script="Viet" typeface="Times New Roman"/>
+        <a:font script="Uigh" typeface="Microsoft Uighur"/>
+        <a:font script="Geor" typeface="Sylfaen"/>
+        <a:font script="Armn" typeface="Arial"/>
+        <a:font script="Bugi" typeface="Leelawadee UI"/>
+        <a:font script="Bopo" typeface="Microsoft JhengHei"/>
+        <a:font script="Java" typeface="Javanese Text"/>
+        <a:font script="Lisu" typeface="Segoe UI"/>
+        <a:font script="Mymr" typeface="Myanmar Text"/>
+        <a:font script="Nkoo" typeface="Ebrima"/>
+        <a:font script="Olck" typeface="Nirmala UI"/>
+        <a:font script="Osma" typeface="Ebrima"/>
+        <a:font script="Phag" typeface="Phagspa"/>
+        <a:font script="Syrn" typeface="Estrangelo Edessa"/>
+        <a:font script="Syrj" typeface="Estrangelo Edessa"/>
+        <a:font script="Syre" typeface="Estrangelo Edessa"/>
+        <a:font script="Sora" typeface="Nirmala UI"/>
+        <a:font script="Tale" typeface="Microsoft Tai Le"/>
+        <a:font script="Talu" typeface="Microsoft New Tai Lue"/>
+        <a:font script="Tfng" typeface="Ebrima"/>
+      </a:majorFont>
+      <a:minorFont>
+        <a:latin typeface="Calibri" panose="020F0502020204030204"/>
+        <a:ea typeface=""/>
+        <a:cs typeface=""/>
+        <a:font script="Jpan" typeface="游ゴシック"/>
+        <a:font script="Hang" typeface="맑은 고딕"/>
+        <a:font script="Hans" typeface="等线"/>
+        <a:font script="Hant" typeface="新細明體"/>
+        <a:font script="Arab" typeface="Arial"/>
+        <a:font script="Hebr" typeface="Arial"/>
+        <a:font script="Thai" typeface="Cordia New"/>
+        <a:font script="Ethi" typeface="Nyala"/>
+        <a:font script="Beng" typeface="Vrinda"/>
+        <a:font script="Gujr" typeface="Shruti"/>
+        <a:font script="Khmr" typeface="DaunPenh"/>
+        <a:font script="Knda" typeface="Tunga"/>
+        <a:font script="Guru" typeface="Raavi"/>
+        <a:font script="Cans" typeface="Euphemia"/>
+        <a:font script="Cher" typeface="Plantagenet Cherokee"/>
+        <a:font script="Yiii" typeface="Microsoft Yi Baiti"/>
+        <a:font script="Tibt" typeface="Microsoft Himalaya"/>
+        <a:font script="Thaa" typeface="MV Boli"/>
+        <a:font script="Deva" typeface="Mangal"/>
+        <a:font script="Telu" typeface="Gautami"/>
+        <a:font script="Taml" typeface="Latha"/>
+        <a:font script="Syrc" typeface="Estrangelo Edessa"/>
+        <a:font script="Orya" typeface="Kalinga"/>
+        <a:font script="Mlym" typeface="Kartika"/>
+        <a:font script="Laoo" typeface="DokChampa"/>
+        <a:font script="Sinh" typeface="Iskoola Pota"/>
+        <a:font script="Mong" typeface="Mongolian Baiti"/>
+        <a:font script="Viet" typeface="Arial"/>
+        <a:font script="Uigh" typeface="Microsoft Uighur"/>
+        <a:font script="Geor" typeface="Sylfaen"/>
+        <a:font script="Armn" typeface="Arial"/>
+        <a:font script="Bugi" typeface="Leelawadee UI"/>
+        <a:font script="Bopo" typeface="Microsoft JhengHei"/>
+        <a:font script="Java" typeface="Javanese Text"/>
+        <a:font script="Lisu" typeface="Segoe UI"/>
+        <a:font script="Mymr" typeface="Myanmar Text"/>
+        <a:font script="Nkoo" typeface="Ebrima"/>
+        <a:font script="Olck" typeface="Nirmala UI"/>
+        <a:font script="Osma" typeface="Ebrima"/>
+        <a:font script="Phag" typeface="Phagspa"/>
+        <a:font script="Syrn" typeface="Estrangelo Edessa"/>
+        <a:font script="Syrj" typeface="Estrangelo Edessa"/>
+        <a:font script="Syre" typeface="Estrangelo Edessa"/>
+        <a:font script="Sora" typeface="Nirmala UI"/>
+        <a:font script="Tale" typeface="Microsoft Tai Le"/>
+        <a:font script="Talu" typeface="Microsoft New Tai Lue"/>
+        <a:font script="Tfng" typeface="Ebrima"/>
+      </a:minorFont>
+    </a:fontScheme>
+    <a:fmtScheme name="Office">
+      <a:fillStyleLst>
+        <a:solidFill>
+          <a:schemeClr val="phClr"/>
+        </a:solidFill>
+        <a:gradFill rotWithShape="1">
+          <a:gsLst>
+            <a:gs pos="0">
+              <a:schemeClr val="phClr">
+                <a:lumMod val="110000"/>
+                <a:satMod val="105000"/>
+                <a:tint val="67000"/>
+              </a:schemeClr>
+            </a:gs>
+            <a:gs pos="50000">
+              <a:schemeClr val="phClr">
+                <a:lumMod val="105000"/>
+                <a:satMod val="103000"/>
+                <a:tint val="73000"/>
+              </a:schemeClr>
+            </a:gs>
+            <a:gs pos="100000">
+              <a:schemeClr val="phClr">
+                <a:lumMod val="105000"/>
+                <a:satMod val="109000"/>
+                <a:tint val="81000"/>
+              </a:schemeClr>
+            </a:gs>
+          </a:gsLst>
+          <a:lin ang="5400000" scaled="0"/>
+        </a:gradFill>
+        <a:gradFill rotWithShape="1">
+          <a:gsLst>
+            <a:gs pos="0">
+              <a:schemeClr val="phClr">
+                <a:satMod val="103000"/>
+                <a:lumMod val="102000"/>
+                <a:tint val="94000"/>
+              </a:schemeClr>
+            </a:gs>
+            <a:gs pos="50000">
+              <a:schemeClr val="phClr">
+                <a:satMod val="110000"/>
+                <a:lumMod val="100000"/>
+                <a:shade val="100000"/>
+              </a:schemeClr>
+            </a:gs>
+            <a:gs pos="100000">
+              <a:schemeClr val="phClr">
+                <a:lumMod val="99000"/>
+                <a:satMod val="120000"/>
+                <a:shade val="78000"/>
+              </a:schemeClr>
+            </a:gs>
+          </a:gsLst>
+          <a:lin ang="5400000" scaled="0"/>
+        </a:gradFill>
+      </a:fillStyleLst>
+      <a:lnStyleLst>
+        <a:ln w="6350" cap="flat" cmpd="sng" algn="ctr">
+          <a:solidFill>
+            <a:schemeClr val="phClr"/>
+          </a:solidFill>
+          <a:prstDash val="solid"/>
+          <a:miter lim="800000"/>
+        </a:ln>
+        <a:ln w="12700" cap="flat" cmpd="sng" algn="ctr">
+          <a:solidFill>
+            <a:schemeClr val="phClr"/>
+          </a:solidFill>
+          <a:prstDash val="solid"/>
+          <a:miter lim="800000"/>
+        </a:ln>
+        <a:ln w="19050" cap="flat" cmpd="sng" algn="ctr">
+          <a:solidFill>
+            <a:schemeClr val="phClr"/>
+          </a:solidFill>
+          <a:prstDash val="solid"/>
+          <a:miter lim="800000"/>
+        </a:ln>
+      </a:lnStyleLst>
+      <a:effectStyleLst>
+        <a:effectStyle>
+          <a:effectLst/>
+        </a:effectStyle>
+        <a:effectStyle>
+          <a:effectLst/>
+        </a:effectStyle>
+        <a:effectStyle>
+          <a:effectLst>
+            <a:outerShdw blurRad="57150" dist="19050" dir="5400000" algn="ctr" rotWithShape="0">
+              <a:srgbClr val="000000">
+                <a:alpha val="63000"/>
+              </a:srgbClr>
+            </a:outerShdw>
+          </a:effectLst>
+        </a:effectStyle>
+      </a:effectStyleLst>
+      <a:bgFillStyleLst>
+        <a:solidFill>
+          <a:schemeClr val="phClr"/>
+        </a:solidFill>
+        <a:solidFill>
+          <a:schemeClr val="phClr">
+            <a:tint val="95000"/>
+            <a:satMod val="170000"/>
+          </a:schemeClr>
+        </a:solidFill>
+        <a:gradFill rotWithShape="1">
+          <a:gsLst>
+            <a:gs pos="0">
+              <a:schemeClr val="phClr">
+                <a:tint val="93000"/>
+                <a:satMod val="150000"/>
+                <a:shade val="98000"/>
+                <a:lumMod val="102000"/>
+              </a:schemeClr>
+            </a:gs>
+            <a:gs pos="50000">
+              <a:schemeClr val="phClr">
+                <a:tint val="98000"/>
+                <a:satMod val="130000"/>
+                <a:shade val="90000"/>
+                <a:lumMod val="103000"/>
+              </a:schemeClr>
+            </a:gs>
+            <a:gs pos="100000">
+              <a:schemeClr val="phClr">
+                <a:shade val="63000"/>
+                <a:satMod val="120000"/>
+              </a:schemeClr>
+            </a:gs>
+          </a:gsLst>
+          <a:lin ang="5400000" scaled="0"/>
+        </a:gradFill>
+      </a:bgFillStyleLst>
+    </a:fmtScheme>
+  </a:themeElements>
+  <a:objectDefaults/>
+  <a:extraClrSchemeLst/>
+  <a:extLst>
+    <a:ext uri="{05A4C25C-085E-4340-85A3-A5531E510DB2}">
+      <thm15:themeFamily xmlns:thm15="http://schemas.microsoft.com/office/thememl/2012/main" name="Office Theme" id="{62F939B6-93AF-4DB8-9C6B-D6C7DFDC589F}" vid="{4A3C46E8-61CC-4603-A589-7422A47A8E4A}"/>
+    </a:ext>
+  </a:extLst>
+</a:theme>
 </file>
</xml_diff>

<commit_message>
added logline and mechanics
</commit_message>
<xml_diff>
--- a/Group 14.pptx
+++ b/Group 14.pptx
@@ -215,7 +215,7 @@
           <a:p>
             <a:fld id="{0E979622-FC95-4062-B0FB-BFF025AB3596}" type="datetimeFigureOut">
               <a:rPr lang="en-US" smtClean="0"/>
-              <a:t>18-Oct-16</a:t>
+              <a:t>10/18/2016</a:t>
             </a:fld>
             <a:endParaRPr lang="en-US"/>
           </a:p>
@@ -310,7 +310,6 @@
               <a:rPr lang="en-US"/>
               <a:t>Fifth level</a:t>
             </a:r>
-            <a:endParaRPr lang="en-US"/>
           </a:p>
         </p:txBody>
       </p:sp>
@@ -6541,15 +6540,16 @@
           <a:bodyPr/>
           <a:lstStyle/>
           <a:p>
+            <a:pPr marL="0" indent="0">
+              <a:buNone/>
+            </a:pPr>
+            <a:endParaRPr lang="en-GB" dirty="0"/>
+          </a:p>
+          <a:p>
             <a:r>
               <a:rPr lang="en-GB" dirty="0"/>
-              <a:t>A librarian, a bookshop in space, alien bookworms trying to destroy history, Kill worms to </a:t>
-            </a:r>
-            <a:r>
-              <a:rPr lang="en-GB"/>
-              <a:t>save earth.</a:t>
-            </a:r>
-            <a:endParaRPr lang="en-GB" dirty="0"/>
+              <a:t>The history of earth is at risk when book mites that consume history invade a bookshop on the moon</a:t>
+            </a:r>
           </a:p>
         </p:txBody>
       </p:sp>
@@ -6861,15 +6861,27 @@
             </a:r>
           </a:p>
           <a:p>
+            <a:pPr marL="0" indent="0">
+              <a:buNone/>
+            </a:pPr>
+            <a:endParaRPr lang="en-GB" dirty="0"/>
+          </a:p>
+          <a:p>
             <a:r>
               <a:rPr lang="en-GB" dirty="0"/>
-              <a:t>Player will sort books in chronological order and size</a:t>
-            </a:r>
+              <a:t>Player will have to stack the books in such a way that there are no gaps in  order to trigger the secret doors that lead to the most important books in history</a:t>
+            </a:r>
+          </a:p>
+          <a:p>
+            <a:pPr marL="0" indent="0">
+              <a:buNone/>
+            </a:pPr>
+            <a:endParaRPr lang="en-GB" dirty="0"/>
           </a:p>
           <a:p>
             <a:r>
               <a:rPr lang="en-GB" dirty="0"/>
-              <a:t>The player will also shoot enemies/ worms with lasers</a:t>
+              <a:t>The player will also shoot mites/ worms with lasers to protect the books</a:t>
             </a:r>
           </a:p>
           <a:p>

</xml_diff>

<commit_message>
Completed Art Style Slide
</commit_message>
<xml_diff>
--- a/Group 14.pptx
+++ b/Group 14.pptx
@@ -215,7 +215,7 @@
           <a:p>
             <a:fld id="{0E979622-FC95-4062-B0FB-BFF025AB3596}" type="datetimeFigureOut">
               <a:rPr lang="en-US" smtClean="0"/>
-              <a:t>10/18/2016</a:t>
+              <a:t>10/19/2016</a:t>
             </a:fld>
             <a:endParaRPr lang="en-US"/>
           </a:p>
@@ -1456,7 +1456,7 @@
             <a:fld id="{4CDA0734-6088-4A11-8A2B-97B609E3D287}" type="datetimeFigureOut">
               <a:rPr lang="en-GB" smtClean="0"/>
               <a:pPr/>
-              <a:t>18/10/2016</a:t>
+              <a:t>19/10/2016</a:t>
             </a:fld>
             <a:endParaRPr lang="en-GB"/>
           </a:p>
@@ -1709,7 +1709,7 @@
             <a:fld id="{4CDA0734-6088-4A11-8A2B-97B609E3D287}" type="datetimeFigureOut">
               <a:rPr lang="en-GB" smtClean="0"/>
               <a:pPr/>
-              <a:t>18/10/2016</a:t>
+              <a:t>19/10/2016</a:t>
             </a:fld>
             <a:endParaRPr lang="en-GB"/>
           </a:p>
@@ -2025,7 +2025,7 @@
             <a:fld id="{4CDA0734-6088-4A11-8A2B-97B609E3D287}" type="datetimeFigureOut">
               <a:rPr lang="en-GB" smtClean="0"/>
               <a:pPr/>
-              <a:t>18/10/2016</a:t>
+              <a:t>19/10/2016</a:t>
             </a:fld>
             <a:endParaRPr lang="en-GB"/>
           </a:p>
@@ -2368,7 +2368,7 @@
             <a:fld id="{4CDA0734-6088-4A11-8A2B-97B609E3D287}" type="datetimeFigureOut">
               <a:rPr lang="en-GB" smtClean="0"/>
               <a:pPr/>
-              <a:t>18/10/2016</a:t>
+              <a:t>19/10/2016</a:t>
             </a:fld>
             <a:endParaRPr lang="en-GB"/>
           </a:p>
@@ -2684,7 +2684,7 @@
             <a:fld id="{4CDA0734-6088-4A11-8A2B-97B609E3D287}" type="datetimeFigureOut">
               <a:rPr lang="en-GB" smtClean="0"/>
               <a:pPr/>
-              <a:t>18/10/2016</a:t>
+              <a:t>19/10/2016</a:t>
             </a:fld>
             <a:endParaRPr lang="en-GB"/>
           </a:p>
@@ -3079,7 +3079,7 @@
             <a:fld id="{4CDA0734-6088-4A11-8A2B-97B609E3D287}" type="datetimeFigureOut">
               <a:rPr lang="en-GB" smtClean="0"/>
               <a:pPr/>
-              <a:t>18/10/2016</a:t>
+              <a:t>19/10/2016</a:t>
             </a:fld>
             <a:endParaRPr lang="en-GB"/>
           </a:p>
@@ -3251,7 +3251,7 @@
             <a:fld id="{4CDA0734-6088-4A11-8A2B-97B609E3D287}" type="datetimeFigureOut">
               <a:rPr lang="en-GB" smtClean="0"/>
               <a:pPr/>
-              <a:t>18/10/2016</a:t>
+              <a:t>19/10/2016</a:t>
             </a:fld>
             <a:endParaRPr lang="en-GB"/>
           </a:p>
@@ -3433,7 +3433,7 @@
             <a:fld id="{4CDA0734-6088-4A11-8A2B-97B609E3D287}" type="datetimeFigureOut">
               <a:rPr lang="en-GB" smtClean="0"/>
               <a:pPr/>
-              <a:t>18/10/2016</a:t>
+              <a:t>19/10/2016</a:t>
             </a:fld>
             <a:endParaRPr lang="en-GB"/>
           </a:p>
@@ -3611,7 +3611,7 @@
             <a:fld id="{4CDA0734-6088-4A11-8A2B-97B609E3D287}" type="datetimeFigureOut">
               <a:rPr lang="en-GB" smtClean="0"/>
               <a:pPr/>
-              <a:t>18/10/2016</a:t>
+              <a:t>19/10/2016</a:t>
             </a:fld>
             <a:endParaRPr lang="en-GB"/>
           </a:p>
@@ -3860,7 +3860,7 @@
             <a:fld id="{4CDA0734-6088-4A11-8A2B-97B609E3D287}" type="datetimeFigureOut">
               <a:rPr lang="en-GB" smtClean="0"/>
               <a:pPr/>
-              <a:t>18/10/2016</a:t>
+              <a:t>19/10/2016</a:t>
             </a:fld>
             <a:endParaRPr lang="en-GB"/>
           </a:p>
@@ -4094,7 +4094,7 @@
             <a:fld id="{4CDA0734-6088-4A11-8A2B-97B609E3D287}" type="datetimeFigureOut">
               <a:rPr lang="en-GB" smtClean="0"/>
               <a:pPr/>
-              <a:t>18/10/2016</a:t>
+              <a:t>19/10/2016</a:t>
             </a:fld>
             <a:endParaRPr lang="en-GB"/>
           </a:p>
@@ -4470,7 +4470,7 @@
             <a:fld id="{4CDA0734-6088-4A11-8A2B-97B609E3D287}" type="datetimeFigureOut">
               <a:rPr lang="en-GB" smtClean="0"/>
               <a:pPr/>
-              <a:t>18/10/2016</a:t>
+              <a:t>19/10/2016</a:t>
             </a:fld>
             <a:endParaRPr lang="en-GB"/>
           </a:p>
@@ -4595,7 +4595,7 @@
             <a:fld id="{4CDA0734-6088-4A11-8A2B-97B609E3D287}" type="datetimeFigureOut">
               <a:rPr lang="en-GB" smtClean="0"/>
               <a:pPr/>
-              <a:t>18/10/2016</a:t>
+              <a:t>19/10/2016</a:t>
             </a:fld>
             <a:endParaRPr lang="en-GB"/>
           </a:p>
@@ -4692,7 +4692,7 @@
             <a:fld id="{4CDA0734-6088-4A11-8A2B-97B609E3D287}" type="datetimeFigureOut">
               <a:rPr lang="en-GB" smtClean="0"/>
               <a:pPr/>
-              <a:t>18/10/2016</a:t>
+              <a:t>19/10/2016</a:t>
             </a:fld>
             <a:endParaRPr lang="en-GB"/>
           </a:p>
@@ -4949,7 +4949,7 @@
             <a:fld id="{4CDA0734-6088-4A11-8A2B-97B609E3D287}" type="datetimeFigureOut">
               <a:rPr lang="en-GB" smtClean="0"/>
               <a:pPr/>
-              <a:t>18/10/2016</a:t>
+              <a:t>19/10/2016</a:t>
             </a:fld>
             <a:endParaRPr lang="en-GB"/>
           </a:p>
@@ -5214,7 +5214,7 @@
             <a:fld id="{4CDA0734-6088-4A11-8A2B-97B609E3D287}" type="datetimeFigureOut">
               <a:rPr lang="en-GB" smtClean="0"/>
               <a:pPr/>
-              <a:t>18/10/2016</a:t>
+              <a:t>19/10/2016</a:t>
             </a:fld>
             <a:endParaRPr lang="en-GB"/>
           </a:p>
@@ -5959,7 +5959,7 @@
             <a:fld id="{4CDA0734-6088-4A11-8A2B-97B609E3D287}" type="datetimeFigureOut">
               <a:rPr lang="en-GB" smtClean="0"/>
               <a:pPr/>
-              <a:t>18/10/2016</a:t>
+              <a:t>19/10/2016</a:t>
             </a:fld>
             <a:endParaRPr lang="en-GB"/>
           </a:p>
@@ -7831,7 +7831,34 @@
       </p:grpSpPr>
       <p:sp>
         <p:nvSpPr>
-          <p:cNvPr id="8" name="Content Placeholder 7"/>
+          <p:cNvPr id="5" name="Title 1"/>
+          <p:cNvSpPr>
+            <a:spLocks noGrp="1"/>
+          </p:cNvSpPr>
+          <p:nvPr>
+            <p:ph type="title"/>
+          </p:nvPr>
+        </p:nvSpPr>
+        <p:spPr>
+          <a:xfrm>
+            <a:off x="507346" y="82720"/>
+            <a:ext cx="8596668" cy="1320800"/>
+          </a:xfrm>
+        </p:spPr>
+        <p:txBody>
+          <a:bodyPr/>
+          <a:lstStyle/>
+          <a:p>
+            <a:r>
+              <a:rPr lang="en-GB" dirty="0"/>
+              <a:t>Art Style Tom</a:t>
+            </a:r>
+          </a:p>
+        </p:txBody>
+      </p:sp>
+      <p:sp>
+        <p:nvSpPr>
+          <p:cNvPr id="6" name="Content Placeholder 2"/>
           <p:cNvSpPr>
             <a:spLocks noGrp="1"/>
           </p:cNvSpPr>
@@ -7839,38 +7866,129 @@
             <p:ph idx="1"/>
           </p:nvPr>
         </p:nvSpPr>
-        <p:spPr/>
-        <p:txBody>
-          <a:bodyPr/>
-          <a:lstStyle/>
-          <a:p>
+        <p:spPr>
+          <a:xfrm>
+            <a:off x="270934" y="1063309"/>
+            <a:ext cx="8596668" cy="2807651"/>
+          </a:xfrm>
+        </p:spPr>
+        <p:txBody>
+          <a:bodyPr>
+            <a:normAutofit fontScale="85000" lnSpcReduction="20000"/>
+          </a:bodyPr>
+          <a:lstStyle/>
+          <a:p>
+            <a:r>
+              <a:rPr lang="en-GB" dirty="0"/>
+              <a:t>The art style is still yet to be </a:t>
+            </a:r>
+            <a:r>
+              <a:rPr lang="en-GB" dirty="0" smtClean="0"/>
+              <a:t>decided</a:t>
+            </a:r>
+          </a:p>
+          <a:p>
+            <a:pPr marL="0" indent="0">
+              <a:buNone/>
+            </a:pPr>
             <a:endParaRPr lang="en-GB" dirty="0"/>
           </a:p>
-        </p:txBody>
-      </p:sp>
-      <p:sp>
-        <p:nvSpPr>
-          <p:cNvPr id="9" name="Title 8"/>
-          <p:cNvSpPr>
-            <a:spLocks noGrp="1"/>
-          </p:cNvSpPr>
-          <p:nvPr>
-            <p:ph type="title"/>
-          </p:nvPr>
-        </p:nvSpPr>
-        <p:spPr/>
-        <p:txBody>
-          <a:bodyPr/>
-          <a:lstStyle/>
           <a:p>
             <a:r>
               <a:rPr lang="en-GB" dirty="0" smtClean="0"/>
-              <a:t>Art Style Tom</a:t>
-            </a:r>
+              <a:t>The Font Style chosen includes a fading effect. Thus evokes the player feeling of </a:t>
+            </a:r>
+            <a:r>
+              <a:rPr lang="en-GB" dirty="0" err="1" smtClean="0"/>
+              <a:t>vellichor</a:t>
+            </a:r>
+            <a:r>
+              <a:rPr lang="en-GB" dirty="0" smtClean="0"/>
+              <a:t>, because the font has a used and worn down look.</a:t>
+            </a:r>
+          </a:p>
+          <a:p>
             <a:endParaRPr lang="en-GB" dirty="0"/>
           </a:p>
-        </p:txBody>
-      </p:sp>
+          <a:p>
+            <a:r>
+              <a:rPr lang="en-GB" dirty="0" smtClean="0"/>
+              <a:t>As our backgrounds within the game change, when players progress through puzzles. Therefore our colour pallets will also represent that change. </a:t>
+            </a:r>
+          </a:p>
+          <a:p>
+            <a:endParaRPr lang="en-GB" dirty="0" smtClean="0"/>
+          </a:p>
+          <a:p>
+            <a:r>
+              <a:rPr lang="en-GB" dirty="0" smtClean="0"/>
+              <a:t>The colour palettes used on each background will make the player feel out of place, within the game. Therefore producing the emotion of </a:t>
+            </a:r>
+            <a:r>
+              <a:rPr lang="en-GB" dirty="0" err="1" smtClean="0"/>
+              <a:t>Monachopsis</a:t>
+            </a:r>
+            <a:r>
+              <a:rPr lang="en-GB" dirty="0" smtClean="0"/>
+              <a:t>.</a:t>
+            </a:r>
+          </a:p>
+          <a:p>
+            <a:endParaRPr lang="en-GB" dirty="0"/>
+          </a:p>
+          <a:p>
+            <a:endParaRPr lang="en-GB" dirty="0"/>
+          </a:p>
+        </p:txBody>
+      </p:sp>
+      <p:pic>
+        <p:nvPicPr>
+          <p:cNvPr id="7" name="Picture 6"/>
+          <p:cNvPicPr>
+            <a:picLocks noChangeAspect="1"/>
+          </p:cNvPicPr>
+          <p:nvPr/>
+        </p:nvPicPr>
+        <p:blipFill>
+          <a:blip r:embed="rId3"/>
+          <a:stretch>
+            <a:fillRect/>
+          </a:stretch>
+        </p:blipFill>
+        <p:spPr>
+          <a:xfrm>
+            <a:off x="5280804" y="4880670"/>
+            <a:ext cx="3849320" cy="605730"/>
+          </a:xfrm>
+          <a:prstGeom prst="rect">
+            <a:avLst/>
+          </a:prstGeom>
+        </p:spPr>
+      </p:pic>
+      <p:pic>
+        <p:nvPicPr>
+          <p:cNvPr id="10" name="Picture 9"/>
+          <p:cNvPicPr>
+            <a:picLocks noChangeAspect="1"/>
+          </p:cNvPicPr>
+          <p:nvPr/>
+        </p:nvPicPr>
+        <p:blipFill>
+          <a:blip r:embed="rId4"/>
+          <a:stretch>
+            <a:fillRect/>
+          </a:stretch>
+        </p:blipFill>
+        <p:spPr>
+          <a:xfrm>
+            <a:off x="883920" y="4191149"/>
+            <a:ext cx="3921760" cy="2269252"/>
+          </a:xfrm>
+          <a:prstGeom prst="rect">
+            <a:avLst/>
+          </a:prstGeom>
+        </p:spPr>
+      </p:pic>
     </p:spTree>
     <p:extLst>
       <p:ext uri="{BB962C8B-B14F-4D97-AF65-F5344CB8AC3E}">

</xml_diff>

<commit_message>
Changed target audience slide
</commit_message>
<xml_diff>
--- a/Group 14.pptx
+++ b/Group 14.pptx
@@ -6506,7 +6506,14 @@
           <a:p>
             <a:r>
               <a:rPr lang="en-GB" dirty="0"/>
-              <a:t>Group 14</a:t>
+              <a:t>Group 14 </a:t>
+            </a:r>
+            <a:br>
+              <a:rPr lang="en-GB" dirty="0"/>
+            </a:br>
+            <a:r>
+              <a:rPr lang="en-GB" dirty="0"/>
+              <a:t>(WIP) Game Title</a:t>
             </a:r>
           </a:p>
         </p:txBody>
@@ -6720,20 +6727,47 @@
           </a:xfrm>
         </p:spPr>
         <p:txBody>
-          <a:bodyPr/>
+          <a:bodyPr>
+            <a:normAutofit lnSpcReduction="10000"/>
+          </a:bodyPr>
           <a:lstStyle/>
           <a:p>
             <a:r>
               <a:rPr lang="en-GB" b="1" dirty="0"/>
-              <a:t>Teenagers &amp; young </a:t>
-            </a:r>
-            <a:r>
-              <a:rPr lang="en-GB" b="1" dirty="0" err="1"/>
-              <a:t>adulsts</a:t>
-            </a:r>
+              <a:t>Male children and teenagers</a:t>
+            </a:r>
+          </a:p>
+          <a:p>
+            <a:r>
+              <a:rPr lang="en-GB" dirty="0"/>
+              <a:t>Ages 8- 16</a:t>
+            </a:r>
+          </a:p>
+          <a:p>
+            <a:pPr marL="0" indent="0">
+              <a:buNone/>
+            </a:pPr>
+            <a:r>
+              <a:rPr lang="en-GB" dirty="0"/>
+              <a:t>Like puzzle games </a:t>
+            </a:r>
+          </a:p>
+          <a:p>
+            <a:pPr marL="0" indent="0">
+              <a:buNone/>
+            </a:pPr>
+            <a:r>
+              <a:rPr lang="en-GB" dirty="0"/>
+              <a:t>Educational for children</a:t>
+            </a:r>
+          </a:p>
+          <a:p>
+            <a:endParaRPr lang="en-GB" b="1" dirty="0"/>
+          </a:p>
+          <a:p>
             <a:r>
               <a:rPr lang="en-GB" b="1" dirty="0"/>
-              <a:t> will find the historical theme interesting.</a:t>
+              <a:t>Teenagers &amp; young adults will find the historical theme interesting.</a:t>
             </a:r>
           </a:p>
           <a:p>
@@ -6746,6 +6780,9 @@
             </a:r>
           </a:p>
           <a:p>
+            <a:pPr marL="0" indent="0">
+              <a:buNone/>
+            </a:pPr>
             <a:endParaRPr lang="en-GB" dirty="0"/>
           </a:p>
           <a:p>
@@ -6755,7 +6792,7 @@
             </a:r>
             <a:r>
               <a:rPr lang="en-GB" dirty="0" err="1"/>
-              <a:t>vellichor</a:t>
+              <a:t>Vellichor</a:t>
             </a:r>
             <a:r>
               <a:rPr lang="en-GB" dirty="0"/>

</xml_diff>